<commit_message>
Ajouts cdc + arborescence ppt
</commit_message>
<xml_diff>
--- a/PPT/PFR.pptx
+++ b/PPT/PFR.pptx
@@ -3011,7 +3011,12 @@
         <p:txBody>
           <a:bodyPr/>
           <a:p>
-            <a:endParaRPr lang="en-US"/>
+            <a:pPr algn="ctr"/>
+            <a:r>
+              <a:rPr lang="fr-FR" altLang="en-US" b="1"/>
+              <a:t>Charte Graphique :</a:t>
+            </a:r>
+            <a:endParaRPr lang="fr-FR" altLang="en-US" b="1"/>
           </a:p>
         </p:txBody>
       </p:sp>
@@ -3029,7 +3034,11 @@
         <p:txBody>
           <a:bodyPr/>
           <a:p>
-            <a:endParaRPr lang="en-US"/>
+            <a:r>
+              <a:rPr lang="fr-FR" altLang="en-US"/>
+              <a:t>Au niveau de la charte graphique, je dois simplement reprendre les mêmes éléments que sur leur application web.</a:t>
+            </a:r>
+            <a:endParaRPr lang="fr-FR" altLang="en-US"/>
           </a:p>
         </p:txBody>
       </p:sp>
@@ -3065,7 +3074,12 @@
         <p:txBody>
           <a:bodyPr/>
           <a:p>
-            <a:endParaRPr lang="en-US"/>
+            <a:pPr algn="ctr"/>
+            <a:r>
+              <a:rPr lang="fr-FR" altLang="en-US" b="1"/>
+              <a:t>Droits :</a:t>
+            </a:r>
+            <a:endParaRPr lang="fr-FR" altLang="en-US" b="1"/>
           </a:p>
         </p:txBody>
       </p:sp>
@@ -3083,7 +3097,11 @@
         <p:txBody>
           <a:bodyPr/>
           <a:p>
-            <a:endParaRPr lang="en-US"/>
+            <a:r>
+              <a:rPr lang="fr-FR" altLang="en-US"/>
+              <a:t>L’intégralité des droits concernant l’application reviendront à l’entreprise Winlabo.</a:t>
+            </a:r>
+            <a:endParaRPr lang="fr-FR" altLang="en-US"/>
           </a:p>
         </p:txBody>
       </p:sp>
@@ -3119,7 +3137,12 @@
         <p:txBody>
           <a:bodyPr/>
           <a:p>
-            <a:endParaRPr lang="en-US"/>
+            <a:pPr algn="l"/>
+            <a:r>
+              <a:rPr lang="fr-FR" altLang="en-US" b="1"/>
+              <a:t>                         Arborescence</a:t>
+            </a:r>
+            <a:endParaRPr lang="fr-FR" altLang="en-US" b="1"/>
           </a:p>
         </p:txBody>
       </p:sp>
@@ -3141,6 +3164,30 @@
           </a:p>
         </p:txBody>
       </p:sp>
+      <p:pic>
+        <p:nvPicPr>
+          <p:cNvPr id="4" name="Picture 3" descr="Capture d'écran 2023-08-05 193406"/>
+          <p:cNvPicPr>
+            <a:picLocks noChangeAspect="1"/>
+          </p:cNvPicPr>
+          <p:nvPr/>
+        </p:nvPicPr>
+        <p:blipFill>
+          <a:blip r:embed="rId1"/>
+          <a:stretch>
+            <a:fillRect/>
+          </a:stretch>
+        </p:blipFill>
+        <p:spPr>
+          <a:xfrm>
+            <a:off x="822960" y="1516380"/>
+            <a:ext cx="10010140" cy="5170170"/>
+          </a:xfrm>
+          <a:prstGeom prst="rect">
+            <a:avLst/>
+          </a:prstGeom>
+        </p:spPr>
+      </p:pic>
     </p:spTree>
   </p:cSld>
   <p:clrMapOvr>
@@ -3173,7 +3220,12 @@
         <p:txBody>
           <a:bodyPr/>
           <a:p>
-            <a:endParaRPr lang="en-US"/>
+            <a:pPr algn="ctr"/>
+            <a:r>
+              <a:rPr lang="fr-FR" altLang="en-US" b="1"/>
+              <a:t>MAQUETTAGE : ZONING</a:t>
+            </a:r>
+            <a:endParaRPr lang="fr-FR" altLang="en-US" b="1"/>
           </a:p>
         </p:txBody>
       </p:sp>
@@ -3865,7 +3917,12 @@
         <p:txBody>
           <a:bodyPr/>
           <a:p>
-            <a:endParaRPr lang="en-US"/>
+            <a:pPr algn="ctr"/>
+            <a:r>
+              <a:rPr lang="fr-FR" altLang="en-US" b="1"/>
+              <a:t>Objectifs de l’application :</a:t>
+            </a:r>
+            <a:endParaRPr lang="fr-FR" altLang="en-US" b="1"/>
           </a:p>
         </p:txBody>
       </p:sp>
@@ -3883,7 +3940,11 @@
         <p:txBody>
           <a:bodyPr/>
           <a:p>
-            <a:endParaRPr lang="en-US"/>
+            <a:r>
+              <a:rPr lang="fr-FR" altLang="en-US"/>
+              <a:t>Tout simplement de faciliter davantage pour les utilisateurs la déclaration d’évènement indésirables en comparaison de l’application web.</a:t>
+            </a:r>
+            <a:endParaRPr lang="fr-FR" altLang="en-US"/>
           </a:p>
         </p:txBody>
       </p:sp>
@@ -3919,7 +3980,12 @@
         <p:txBody>
           <a:bodyPr/>
           <a:p>
-            <a:endParaRPr lang="en-US"/>
+            <a:pPr algn="ctr"/>
+            <a:r>
+              <a:rPr lang="fr-FR" altLang="en-US" b="1"/>
+              <a:t>Persona:</a:t>
+            </a:r>
+            <a:endParaRPr lang="fr-FR" altLang="en-US" b="1"/>
           </a:p>
         </p:txBody>
       </p:sp>
@@ -3937,6 +4003,30 @@
         <p:txBody>
           <a:bodyPr/>
           <a:p>
+            <a:r>
+              <a:rPr lang="fr-FR" altLang="en-US"/>
+              <a:t>Ce sont tous les c</a:t>
+            </a:r>
+            <a:r>
+              <a:rPr lang="en-US"/>
+              <a:t>entre</a:t>
+            </a:r>
+            <a:r>
+              <a:rPr lang="fr-FR" altLang="en-US"/>
+              <a:t>s</a:t>
+            </a:r>
+            <a:r>
+              <a:rPr lang="en-US"/>
+              <a:t> d’imagerie</a:t>
+            </a:r>
+            <a:r>
+              <a:rPr lang="fr-FR" altLang="en-US"/>
+              <a:t>s</a:t>
+            </a:r>
+            <a:r>
+              <a:rPr lang="en-US"/>
+              <a:t> parce qu’ils ont des normes à respecter et il leur faut un logiciel de management de la qualité. </a:t>
+            </a:r>
             <a:endParaRPr lang="en-US"/>
           </a:p>
         </p:txBody>
@@ -3973,7 +4063,12 @@
         <p:txBody>
           <a:bodyPr/>
           <a:p>
-            <a:endParaRPr lang="en-US"/>
+            <a:pPr algn="ctr"/>
+            <a:r>
+              <a:rPr lang="fr-FR" altLang="en-US" b="1"/>
+              <a:t>Concurrents directs :</a:t>
+            </a:r>
+            <a:endParaRPr lang="fr-FR" altLang="en-US" b="1"/>
           </a:p>
         </p:txBody>
       </p:sp>
@@ -3991,6 +4086,27 @@
         <p:txBody>
           <a:bodyPr/>
           <a:p>
+            <a:pPr algn="ctr"/>
+            <a:r>
+              <a:rPr lang="en-US"/>
+              <a:t>Qualios.com</a:t>
+            </a:r>
+            <a:endParaRPr lang="en-US"/>
+          </a:p>
+          <a:p>
+            <a:pPr algn="ctr"/>
+            <a:r>
+              <a:rPr lang="en-US"/>
+              <a:t>Ageval.fr</a:t>
+            </a:r>
+            <a:endParaRPr lang="en-US"/>
+          </a:p>
+          <a:p>
+            <a:pPr algn="ctr"/>
+            <a:r>
+              <a:rPr lang="en-US"/>
+              <a:t>Qualilab.com</a:t>
+            </a:r>
             <a:endParaRPr lang="en-US"/>
           </a:p>
         </p:txBody>

</xml_diff>

<commit_message>
FIN PPT ET MAJ MAQUETTAGE
</commit_message>
<xml_diff>
--- a/PPT/PFR.pptx
+++ b/PPT/PFR.pptx
@@ -7,21 +7,37 @@
   <p:sldIdLst>
     <p:sldId id="258" r:id="rId3"/>
     <p:sldId id="257" r:id="rId4"/>
-    <p:sldId id="259" r:id="rId5"/>
-    <p:sldId id="260" r:id="rId6"/>
-    <p:sldId id="261" r:id="rId7"/>
-    <p:sldId id="262" r:id="rId8"/>
-    <p:sldId id="263" r:id="rId9"/>
-    <p:sldId id="264" r:id="rId10"/>
-    <p:sldId id="265" r:id="rId11"/>
-    <p:sldId id="266" r:id="rId12"/>
-    <p:sldId id="267" r:id="rId13"/>
+    <p:sldId id="263" r:id="rId5"/>
+    <p:sldId id="264" r:id="rId6"/>
+    <p:sldId id="265" r:id="rId7"/>
+    <p:sldId id="266" r:id="rId8"/>
+    <p:sldId id="267" r:id="rId9"/>
+    <p:sldId id="259" r:id="rId10"/>
+    <p:sldId id="260" r:id="rId11"/>
+    <p:sldId id="261" r:id="rId12"/>
+    <p:sldId id="262" r:id="rId13"/>
     <p:sldId id="268" r:id="rId14"/>
     <p:sldId id="269" r:id="rId15"/>
     <p:sldId id="270" r:id="rId16"/>
     <p:sldId id="271" r:id="rId17"/>
     <p:sldId id="272" r:id="rId18"/>
     <p:sldId id="273" r:id="rId19"/>
+    <p:sldId id="278" r:id="rId20"/>
+    <p:sldId id="279" r:id="rId21"/>
+    <p:sldId id="280" r:id="rId22"/>
+    <p:sldId id="283" r:id="rId23"/>
+    <p:sldId id="281" r:id="rId24"/>
+    <p:sldId id="282" r:id="rId25"/>
+    <p:sldId id="284" r:id="rId26"/>
+    <p:sldId id="285" r:id="rId27"/>
+    <p:sldId id="286" r:id="rId28"/>
+    <p:sldId id="287" r:id="rId29"/>
+    <p:sldId id="288" r:id="rId30"/>
+    <p:sldId id="289" r:id="rId31"/>
+    <p:sldId id="290" r:id="rId32"/>
+    <p:sldId id="291" r:id="rId33"/>
+    <p:sldId id="293" r:id="rId34"/>
+    <p:sldId id="292" r:id="rId35"/>
   </p:sldIdLst>
   <p:sldSz cx="12192000" cy="6858000"/>
   <p:notesSz cx="6858000" cy="9144000"/>
@@ -3011,37 +3027,36 @@
         <p:txBody>
           <a:bodyPr/>
           <a:p>
-            <a:pPr algn="ctr"/>
-            <a:r>
-              <a:rPr lang="fr-FR" altLang="en-US" b="1"/>
-              <a:t>Charte Graphique :</a:t>
-            </a:r>
-            <a:endParaRPr lang="fr-FR" altLang="en-US" b="1"/>
-          </a:p>
-        </p:txBody>
-      </p:sp>
-      <p:sp>
-        <p:nvSpPr>
-          <p:cNvPr id="3" name="Content Placeholder 2"/>
-          <p:cNvSpPr>
-            <a:spLocks noGrp="1"/>
-          </p:cNvSpPr>
+            <a:endParaRPr lang="en-US"/>
+          </a:p>
+        </p:txBody>
+      </p:sp>
+      <p:pic>
+        <p:nvPicPr>
+          <p:cNvPr id="4" name="Content Placeholder 3" descr="photo_2_2023-07-01_11-39-32"/>
+          <p:cNvPicPr>
+            <a:picLocks noChangeAspect="1"/>
+          </p:cNvPicPr>
           <p:nvPr>
             <p:ph idx="1"/>
           </p:nvPr>
-        </p:nvSpPr>
-        <p:spPr/>
-        <p:txBody>
-          <a:bodyPr/>
-          <a:p>
-            <a:r>
-              <a:rPr lang="fr-FR" altLang="en-US"/>
-              <a:t>Au niveau de la charte graphique, je dois simplement reprendre les mêmes éléments que sur leur application web.</a:t>
-            </a:r>
-            <a:endParaRPr lang="fr-FR" altLang="en-US"/>
-          </a:p>
-        </p:txBody>
-      </p:sp>
+        </p:nvPicPr>
+        <p:blipFill>
+          <a:blip r:embed="rId1"/>
+          <a:stretch>
+            <a:fillRect/>
+          </a:stretch>
+        </p:blipFill>
+        <p:spPr>
+          <a:xfrm>
+            <a:off x="455295" y="365125"/>
+            <a:ext cx="11294745" cy="6109970"/>
+          </a:xfrm>
+          <a:prstGeom prst="rect">
+            <a:avLst/>
+          </a:prstGeom>
+        </p:spPr>
+      </p:pic>
     </p:spTree>
   </p:cSld>
   <p:clrMapOvr>
@@ -3074,37 +3089,36 @@
         <p:txBody>
           <a:bodyPr/>
           <a:p>
-            <a:pPr algn="ctr"/>
-            <a:r>
-              <a:rPr lang="fr-FR" altLang="en-US" b="1"/>
-              <a:t>Droits :</a:t>
-            </a:r>
-            <a:endParaRPr lang="fr-FR" altLang="en-US" b="1"/>
-          </a:p>
-        </p:txBody>
-      </p:sp>
-      <p:sp>
-        <p:nvSpPr>
-          <p:cNvPr id="3" name="Content Placeholder 2"/>
-          <p:cNvSpPr>
-            <a:spLocks noGrp="1"/>
-          </p:cNvSpPr>
+            <a:endParaRPr lang="en-US"/>
+          </a:p>
+        </p:txBody>
+      </p:sp>
+      <p:pic>
+        <p:nvPicPr>
+          <p:cNvPr id="4" name="Content Placeholder 3" descr="photo_5_2023-07-01_11-39-32"/>
+          <p:cNvPicPr>
+            <a:picLocks noChangeAspect="1"/>
+          </p:cNvPicPr>
           <p:nvPr>
             <p:ph idx="1"/>
           </p:nvPr>
-        </p:nvSpPr>
-        <p:spPr/>
-        <p:txBody>
-          <a:bodyPr/>
-          <a:p>
-            <a:r>
-              <a:rPr lang="fr-FR" altLang="en-US"/>
-              <a:t>L’intégralité des droits concernant l’application reviendront à l’entreprise Winlabo.</a:t>
-            </a:r>
-            <a:endParaRPr lang="fr-FR" altLang="en-US"/>
-          </a:p>
-        </p:txBody>
-      </p:sp>
+        </p:nvPicPr>
+        <p:blipFill>
+          <a:blip r:embed="rId1"/>
+          <a:stretch>
+            <a:fillRect/>
+          </a:stretch>
+        </p:blipFill>
+        <p:spPr>
+          <a:xfrm>
+            <a:off x="508000" y="365125"/>
+            <a:ext cx="11176635" cy="6111240"/>
+          </a:xfrm>
+          <a:prstGeom prst="rect">
+            <a:avLst/>
+          </a:prstGeom>
+        </p:spPr>
+      </p:pic>
     </p:spTree>
   </p:cSld>
   <p:clrMapOvr>
@@ -3243,10 +3257,89 @@
         <p:txBody>
           <a:bodyPr/>
           <a:p>
-            <a:endParaRPr lang="en-US"/>
-          </a:p>
-        </p:txBody>
-      </p:sp>
+            <a:pPr marL="0" indent="0">
+              <a:buNone/>
+            </a:pPr>
+            <a:r>
+              <a:rPr lang="fr-FR" altLang="en-US"/>
+              <a:t>LOGIN                                    ACCUEIL                                     DECLARATION</a:t>
+            </a:r>
+            <a:endParaRPr lang="fr-FR" altLang="en-US"/>
+          </a:p>
+        </p:txBody>
+      </p:sp>
+      <p:pic>
+        <p:nvPicPr>
+          <p:cNvPr id="4" name="Picture 3" descr="Capture d'écran 2023-08-06 095923"/>
+          <p:cNvPicPr>
+            <a:picLocks noChangeAspect="1"/>
+          </p:cNvPicPr>
+          <p:nvPr/>
+        </p:nvPicPr>
+        <p:blipFill>
+          <a:blip r:embed="rId1"/>
+          <a:stretch>
+            <a:fillRect/>
+          </a:stretch>
+        </p:blipFill>
+        <p:spPr>
+          <a:xfrm>
+            <a:off x="273050" y="2286000"/>
+            <a:ext cx="2613660" cy="4499610"/>
+          </a:xfrm>
+          <a:prstGeom prst="rect">
+            <a:avLst/>
+          </a:prstGeom>
+        </p:spPr>
+      </p:pic>
+      <p:pic>
+        <p:nvPicPr>
+          <p:cNvPr id="6" name="Picture 5" descr="Capture d'écran 2023-08-06 100052"/>
+          <p:cNvPicPr>
+            <a:picLocks noChangeAspect="1"/>
+          </p:cNvPicPr>
+          <p:nvPr/>
+        </p:nvPicPr>
+        <p:blipFill>
+          <a:blip r:embed="rId2"/>
+          <a:stretch>
+            <a:fillRect/>
+          </a:stretch>
+        </p:blipFill>
+        <p:spPr>
+          <a:xfrm>
+            <a:off x="4250690" y="2286000"/>
+            <a:ext cx="2668270" cy="4572000"/>
+          </a:xfrm>
+          <a:prstGeom prst="rect">
+            <a:avLst/>
+          </a:prstGeom>
+        </p:spPr>
+      </p:pic>
+      <p:pic>
+        <p:nvPicPr>
+          <p:cNvPr id="8" name="Picture 7" descr="Capture d'écran 2023-08-06 101036"/>
+          <p:cNvPicPr>
+            <a:picLocks noChangeAspect="1"/>
+          </p:cNvPicPr>
+          <p:nvPr/>
+        </p:nvPicPr>
+        <p:blipFill>
+          <a:blip r:embed="rId3"/>
+          <a:stretch>
+            <a:fillRect/>
+          </a:stretch>
+        </p:blipFill>
+        <p:spPr>
+          <a:xfrm>
+            <a:off x="8973820" y="2286000"/>
+            <a:ext cx="2557145" cy="4572000"/>
+          </a:xfrm>
+          <a:prstGeom prst="rect">
+            <a:avLst/>
+          </a:prstGeom>
+        </p:spPr>
+      </p:pic>
     </p:spTree>
   </p:cSld>
   <p:clrMapOvr>
@@ -3279,7 +3372,12 @@
         <p:txBody>
           <a:bodyPr/>
           <a:p>
-            <a:endParaRPr lang="en-US"/>
+            <a:pPr algn="ctr"/>
+            <a:r>
+              <a:rPr lang="fr-FR" altLang="en-US" b="1"/>
+              <a:t>MAQUETTAGE : ZONING</a:t>
+            </a:r>
+            <a:endParaRPr lang="fr-FR" altLang="en-US" b="1"/>
           </a:p>
         </p:txBody>
       </p:sp>
@@ -3297,10 +3395,65 @@
         <p:txBody>
           <a:bodyPr/>
           <a:p>
-            <a:endParaRPr lang="en-US"/>
-          </a:p>
-        </p:txBody>
-      </p:sp>
+            <a:pPr marL="0" indent="0">
+              <a:buNone/>
+            </a:pPr>
+            <a:r>
+              <a:rPr lang="fr-FR" altLang="en-US"/>
+              <a:t>TRAITEMENT/DEROGATION                      ENREGISTREMENT                    </a:t>
+            </a:r>
+            <a:endParaRPr lang="fr-FR" altLang="en-US"/>
+          </a:p>
+        </p:txBody>
+      </p:sp>
+      <p:pic>
+        <p:nvPicPr>
+          <p:cNvPr id="4" name="Picture 3" descr="Capture d'écran 2023-08-06 102330"/>
+          <p:cNvPicPr>
+            <a:picLocks noChangeAspect="1"/>
+          </p:cNvPicPr>
+          <p:nvPr/>
+        </p:nvPicPr>
+        <p:blipFill>
+          <a:blip r:embed="rId1"/>
+          <a:stretch>
+            <a:fillRect/>
+          </a:stretch>
+        </p:blipFill>
+        <p:spPr>
+          <a:xfrm>
+            <a:off x="1520190" y="2258695"/>
+            <a:ext cx="2973070" cy="4599940"/>
+          </a:xfrm>
+          <a:prstGeom prst="rect">
+            <a:avLst/>
+          </a:prstGeom>
+        </p:spPr>
+      </p:pic>
+      <p:pic>
+        <p:nvPicPr>
+          <p:cNvPr id="5" name="Picture 4" descr="Capture d'écran 2023-08-06 102637"/>
+          <p:cNvPicPr>
+            <a:picLocks noChangeAspect="1"/>
+          </p:cNvPicPr>
+          <p:nvPr/>
+        </p:nvPicPr>
+        <p:blipFill>
+          <a:blip r:embed="rId2"/>
+          <a:stretch>
+            <a:fillRect/>
+          </a:stretch>
+        </p:blipFill>
+        <p:spPr>
+          <a:xfrm>
+            <a:off x="6867525" y="2258695"/>
+            <a:ext cx="2622550" cy="4650740"/>
+          </a:xfrm>
+          <a:prstGeom prst="rect">
+            <a:avLst/>
+          </a:prstGeom>
+        </p:spPr>
+      </p:pic>
     </p:spTree>
   </p:cSld>
   <p:clrMapOvr>
@@ -3333,7 +3486,12 @@
         <p:txBody>
           <a:bodyPr/>
           <a:p>
-            <a:endParaRPr lang="en-US"/>
+            <a:pPr algn="ctr"/>
+            <a:r>
+              <a:rPr lang="fr-FR" altLang="en-US" b="1"/>
+              <a:t>MAQUETTAGE : WIREFRAME</a:t>
+            </a:r>
+            <a:endParaRPr lang="fr-FR" altLang="en-US" b="1"/>
           </a:p>
         </p:txBody>
       </p:sp>
@@ -3351,10 +3509,89 @@
         <p:txBody>
           <a:bodyPr/>
           <a:p>
-            <a:endParaRPr lang="en-US"/>
-          </a:p>
-        </p:txBody>
-      </p:sp>
+            <a:pPr marL="0" indent="0">
+              <a:buNone/>
+            </a:pPr>
+            <a:r>
+              <a:rPr lang="fr-FR" altLang="en-US"/>
+              <a:t>LOGIN                                       ACCUEIL                              DECLARATION</a:t>
+            </a:r>
+            <a:endParaRPr lang="fr-FR" altLang="en-US"/>
+          </a:p>
+        </p:txBody>
+      </p:sp>
+      <p:pic>
+        <p:nvPicPr>
+          <p:cNvPr id="4" name="Picture 3" descr="Capture d'écran 2023-08-06 103015"/>
+          <p:cNvPicPr>
+            <a:picLocks noChangeAspect="1"/>
+          </p:cNvPicPr>
+          <p:nvPr/>
+        </p:nvPicPr>
+        <p:blipFill>
+          <a:blip r:embed="rId1"/>
+          <a:stretch>
+            <a:fillRect/>
+          </a:stretch>
+        </p:blipFill>
+        <p:spPr>
+          <a:xfrm>
+            <a:off x="401955" y="2298700"/>
+            <a:ext cx="2289175" cy="4453255"/>
+          </a:xfrm>
+          <a:prstGeom prst="rect">
+            <a:avLst/>
+          </a:prstGeom>
+        </p:spPr>
+      </p:pic>
+      <p:pic>
+        <p:nvPicPr>
+          <p:cNvPr id="5" name="Picture 4" descr="Capture d'écran 2023-08-06 103457"/>
+          <p:cNvPicPr>
+            <a:picLocks noChangeAspect="1"/>
+          </p:cNvPicPr>
+          <p:nvPr/>
+        </p:nvPicPr>
+        <p:blipFill>
+          <a:blip r:embed="rId2"/>
+          <a:stretch>
+            <a:fillRect/>
+          </a:stretch>
+        </p:blipFill>
+        <p:spPr>
+          <a:xfrm>
+            <a:off x="4563745" y="2298700"/>
+            <a:ext cx="2376170" cy="4448175"/>
+          </a:xfrm>
+          <a:prstGeom prst="rect">
+            <a:avLst/>
+          </a:prstGeom>
+        </p:spPr>
+      </p:pic>
+      <p:pic>
+        <p:nvPicPr>
+          <p:cNvPr id="7" name="Picture 6" descr="Capture d'écran 2023-08-06 103704"/>
+          <p:cNvPicPr>
+            <a:picLocks noChangeAspect="1"/>
+          </p:cNvPicPr>
+          <p:nvPr/>
+        </p:nvPicPr>
+        <p:blipFill>
+          <a:blip r:embed="rId3"/>
+          <a:stretch>
+            <a:fillRect/>
+          </a:stretch>
+        </p:blipFill>
+        <p:spPr>
+          <a:xfrm>
+            <a:off x="8486775" y="2184400"/>
+            <a:ext cx="2376805" cy="4654550"/>
+          </a:xfrm>
+          <a:prstGeom prst="rect">
+            <a:avLst/>
+          </a:prstGeom>
+        </p:spPr>
+      </p:pic>
     </p:spTree>
   </p:cSld>
   <p:clrMapOvr>
@@ -3373,39 +3610,105 @@
         <p:nvPr/>
       </p:nvGrpSpPr>
       <p:grpSpPr/>
-      <p:sp>
-        <p:nvSpPr>
-          <p:cNvPr id="2" name="Title 1"/>
-          <p:cNvSpPr>
-            <a:spLocks noGrp="1"/>
-          </p:cNvSpPr>
-          <p:nvPr>
-            <p:ph type="title"/>
-          </p:nvPr>
-        </p:nvSpPr>
-        <p:spPr/>
-        <p:txBody>
-          <a:bodyPr/>
-          <a:p>
-            <a:endParaRPr lang="en-US"/>
-          </a:p>
-        </p:txBody>
-      </p:sp>
-      <p:sp>
-        <p:nvSpPr>
-          <p:cNvPr id="3" name="Content Placeholder 2"/>
-          <p:cNvSpPr>
-            <a:spLocks noGrp="1"/>
-          </p:cNvSpPr>
-          <p:nvPr>
-            <p:ph idx="1"/>
-          </p:nvPr>
-        </p:nvSpPr>
-        <p:spPr/>
-        <p:txBody>
-          <a:bodyPr/>
-          <a:p>
-            <a:endParaRPr lang="en-US"/>
+      <p:pic>
+        <p:nvPicPr>
+          <p:cNvPr id="4" name="Picture 3" descr="Capture d'écran 2023-08-06 103809"/>
+          <p:cNvPicPr>
+            <a:picLocks noChangeAspect="1"/>
+          </p:cNvPicPr>
+          <p:nvPr/>
+        </p:nvPicPr>
+        <p:blipFill>
+          <a:blip r:embed="rId1"/>
+          <a:stretch>
+            <a:fillRect/>
+          </a:stretch>
+        </p:blipFill>
+        <p:spPr>
+          <a:xfrm>
+            <a:off x="-120015" y="1468120"/>
+            <a:ext cx="2212340" cy="4253230"/>
+          </a:xfrm>
+          <a:prstGeom prst="rect">
+            <a:avLst/>
+          </a:prstGeom>
+        </p:spPr>
+      </p:pic>
+      <p:pic>
+        <p:nvPicPr>
+          <p:cNvPr id="5" name="Picture 4" descr="Capture d'écran 2023-08-06 103834"/>
+          <p:cNvPicPr>
+            <a:picLocks noChangeAspect="1"/>
+          </p:cNvPicPr>
+          <p:nvPr/>
+        </p:nvPicPr>
+        <p:blipFill>
+          <a:blip r:embed="rId2"/>
+          <a:stretch>
+            <a:fillRect/>
+          </a:stretch>
+        </p:blipFill>
+        <p:spPr>
+          <a:xfrm>
+            <a:off x="1993265" y="1551305"/>
+            <a:ext cx="7608570" cy="4170045"/>
+          </a:xfrm>
+          <a:prstGeom prst="rect">
+            <a:avLst/>
+          </a:prstGeom>
+        </p:spPr>
+      </p:pic>
+      <p:pic>
+        <p:nvPicPr>
+          <p:cNvPr id="6" name="Picture 5" descr="Capture d'écran 2023-08-06 103845"/>
+          <p:cNvPicPr>
+            <a:picLocks noChangeAspect="1"/>
+          </p:cNvPicPr>
+          <p:nvPr/>
+        </p:nvPicPr>
+        <p:blipFill>
+          <a:blip r:embed="rId3"/>
+          <a:stretch>
+            <a:fillRect/>
+          </a:stretch>
+        </p:blipFill>
+        <p:spPr>
+          <a:xfrm>
+            <a:off x="9601835" y="1551305"/>
+            <a:ext cx="2606675" cy="4216400"/>
+          </a:xfrm>
+          <a:prstGeom prst="rect">
+            <a:avLst/>
+          </a:prstGeom>
+        </p:spPr>
+      </p:pic>
+      <p:sp>
+        <p:nvSpPr>
+          <p:cNvPr id="9" name="Text Box 8"/>
+          <p:cNvSpPr txBox="1"/>
+          <p:nvPr/>
+        </p:nvSpPr>
+        <p:spPr>
+          <a:xfrm>
+            <a:off x="2945130" y="473710"/>
+            <a:ext cx="5429250" cy="706755"/>
+          </a:xfrm>
+          <a:prstGeom prst="rect">
+            <a:avLst/>
+          </a:prstGeom>
+          <a:noFill/>
+        </p:spPr>
+        <p:txBody>
+          <a:bodyPr wrap="square" rtlCol="0">
+            <a:spAutoFit/>
+          </a:bodyPr>
+          <a:p>
+            <a:pPr algn="ctr"/>
+            <a:r>
+              <a:rPr lang="fr-FR" altLang="en-US" sz="4000"/>
+              <a:t>DECLARATION : SUITE</a:t>
+            </a:r>
+            <a:endParaRPr lang="fr-FR" altLang="en-US" sz="4000"/>
           </a:p>
         </p:txBody>
       </p:sp>
@@ -3441,28 +3744,193 @@
         <p:txBody>
           <a:bodyPr/>
           <a:p>
-            <a:endParaRPr lang="en-US"/>
-          </a:p>
-        </p:txBody>
-      </p:sp>
-      <p:sp>
-        <p:nvSpPr>
-          <p:cNvPr id="3" name="Content Placeholder 2"/>
-          <p:cNvSpPr>
-            <a:spLocks noGrp="1"/>
-          </p:cNvSpPr>
-          <p:nvPr>
-            <p:ph idx="1"/>
-          </p:nvPr>
-        </p:nvSpPr>
-        <p:spPr/>
-        <p:txBody>
-          <a:bodyPr/>
-          <a:p>
-            <a:endParaRPr lang="en-US"/>
-          </a:p>
-        </p:txBody>
-      </p:sp>
+            <a:pPr algn="ctr"/>
+            <a:r>
+              <a:rPr lang="fr-FR" altLang="en-US"/>
+              <a:t>TRAITEMENT/DEROGATION</a:t>
+            </a:r>
+            <a:endParaRPr lang="fr-FR" altLang="en-US"/>
+          </a:p>
+        </p:txBody>
+      </p:sp>
+      <p:pic>
+        <p:nvPicPr>
+          <p:cNvPr id="4" name="Picture 3" descr="Capture d'écran 2023-08-06 104351"/>
+          <p:cNvPicPr>
+            <a:picLocks noChangeAspect="1"/>
+          </p:cNvPicPr>
+          <p:nvPr/>
+        </p:nvPicPr>
+        <p:blipFill>
+          <a:blip r:embed="rId1"/>
+          <a:stretch>
+            <a:fillRect/>
+          </a:stretch>
+        </p:blipFill>
+        <p:spPr>
+          <a:xfrm>
+            <a:off x="272415" y="1348740"/>
+            <a:ext cx="2642870" cy="5300345"/>
+          </a:xfrm>
+          <a:prstGeom prst="rect">
+            <a:avLst/>
+          </a:prstGeom>
+        </p:spPr>
+      </p:pic>
+      <p:pic>
+        <p:nvPicPr>
+          <p:cNvPr id="5" name="Picture 4" descr="Capture d'écran 2023-08-06 104400"/>
+          <p:cNvPicPr>
+            <a:picLocks noChangeAspect="1"/>
+          </p:cNvPicPr>
+          <p:nvPr/>
+        </p:nvPicPr>
+        <p:blipFill>
+          <a:blip r:embed="rId2"/>
+          <a:stretch>
+            <a:fillRect/>
+          </a:stretch>
+        </p:blipFill>
+        <p:spPr>
+          <a:xfrm>
+            <a:off x="3054985" y="1348740"/>
+            <a:ext cx="8531225" cy="5346065"/>
+          </a:xfrm>
+          <a:prstGeom prst="rect">
+            <a:avLst/>
+          </a:prstGeom>
+        </p:spPr>
+      </p:pic>
+    </p:spTree>
+  </p:cSld>
+  <p:clrMapOvr>
+    <a:masterClrMapping/>
+  </p:clrMapOvr>
+</p:sld>
+</file>
+
+<file path=ppt/slides/slide18.xml><?xml version="1.0" encoding="utf-8"?>
+<p:sld xmlns:a="http://schemas.openxmlformats.org/drawingml/2006/main" xmlns:r="http://schemas.openxmlformats.org/officeDocument/2006/relationships" xmlns:p="http://schemas.openxmlformats.org/presentationml/2006/main">
+  <p:cSld>
+    <p:spTree>
+      <p:nvGrpSpPr>
+        <p:cNvPr id="1" name=""/>
+        <p:cNvGrpSpPr/>
+        <p:nvPr/>
+      </p:nvGrpSpPr>
+      <p:grpSpPr/>
+      <p:sp>
+        <p:nvSpPr>
+          <p:cNvPr id="2" name="Title 1"/>
+          <p:cNvSpPr>
+            <a:spLocks noGrp="1"/>
+          </p:cNvSpPr>
+          <p:nvPr>
+            <p:ph type="title"/>
+          </p:nvPr>
+        </p:nvSpPr>
+        <p:spPr/>
+        <p:txBody>
+          <a:bodyPr/>
+          <a:p>
+            <a:pPr algn="ctr"/>
+            <a:r>
+              <a:rPr lang="fr-FR" altLang="en-US"/>
+              <a:t>DEROGATION : SUITE</a:t>
+            </a:r>
+            <a:endParaRPr lang="fr-FR" altLang="en-US"/>
+          </a:p>
+        </p:txBody>
+      </p:sp>
+      <p:pic>
+        <p:nvPicPr>
+          <p:cNvPr id="4" name="Picture 3" descr="Capture d'écran 2023-08-06 104415"/>
+          <p:cNvPicPr>
+            <a:picLocks noChangeAspect="1"/>
+          </p:cNvPicPr>
+          <p:nvPr/>
+        </p:nvPicPr>
+        <p:blipFill>
+          <a:blip r:embed="rId1"/>
+          <a:stretch>
+            <a:fillRect/>
+          </a:stretch>
+        </p:blipFill>
+        <p:spPr>
+          <a:xfrm>
+            <a:off x="3275965" y="1207770"/>
+            <a:ext cx="5640070" cy="5441950"/>
+          </a:xfrm>
+          <a:prstGeom prst="rect">
+            <a:avLst/>
+          </a:prstGeom>
+        </p:spPr>
+      </p:pic>
+    </p:spTree>
+  </p:cSld>
+  <p:clrMapOvr>
+    <a:masterClrMapping/>
+  </p:clrMapOvr>
+</p:sld>
+</file>
+
+<file path=ppt/slides/slide19.xml><?xml version="1.0" encoding="utf-8"?>
+<p:sld xmlns:a="http://schemas.openxmlformats.org/drawingml/2006/main" xmlns:r="http://schemas.openxmlformats.org/officeDocument/2006/relationships" xmlns:p="http://schemas.openxmlformats.org/presentationml/2006/main">
+  <p:cSld>
+    <p:spTree>
+      <p:nvGrpSpPr>
+        <p:cNvPr id="1" name=""/>
+        <p:cNvGrpSpPr/>
+        <p:nvPr/>
+      </p:nvGrpSpPr>
+      <p:grpSpPr/>
+      <p:sp>
+        <p:nvSpPr>
+          <p:cNvPr id="2" name="Title 1"/>
+          <p:cNvSpPr>
+            <a:spLocks noGrp="1"/>
+          </p:cNvSpPr>
+          <p:nvPr>
+            <p:ph type="title"/>
+          </p:nvPr>
+        </p:nvSpPr>
+        <p:spPr/>
+        <p:txBody>
+          <a:bodyPr/>
+          <a:p>
+            <a:pPr algn="ctr"/>
+            <a:r>
+              <a:rPr lang="fr-FR" altLang="en-US"/>
+              <a:t>ENREGISTREMENT</a:t>
+            </a:r>
+            <a:endParaRPr lang="fr-FR" altLang="en-US"/>
+          </a:p>
+        </p:txBody>
+      </p:sp>
+      <p:pic>
+        <p:nvPicPr>
+          <p:cNvPr id="4" name="Picture 3" descr="Capture d'écran 2023-08-06 104611"/>
+          <p:cNvPicPr>
+            <a:picLocks noChangeAspect="1"/>
+          </p:cNvPicPr>
+          <p:nvPr/>
+        </p:nvPicPr>
+        <p:blipFill>
+          <a:blip r:embed="rId1"/>
+          <a:stretch>
+            <a:fillRect/>
+          </a:stretch>
+        </p:blipFill>
+        <p:spPr>
+          <a:xfrm>
+            <a:off x="3148330" y="1260475"/>
+            <a:ext cx="5999480" cy="5450205"/>
+          </a:xfrm>
+          <a:prstGeom prst="rect">
+            <a:avLst/>
+          </a:prstGeom>
+        </p:spPr>
+      </p:pic>
     </p:spTree>
   </p:cSld>
   <p:clrMapOvr>
@@ -3534,7 +4002,7 @@
           <a:p>
             <a:r>
               <a:rPr lang="fr-FR" altLang="en-US"/>
-              <a:t>Suite à ma demande, ils m’ont demandé de créer l’application mobile de leur logiciel de management de la qualité. Et dans un ppremier temps, uniquement la partie permettant de créer des évènements indésirables.</a:t>
+              <a:t>Suite à ma demande, ils m’ont proposé de créer l’application mobile de leur logiciel de management de la qualité. Et dans un ppremier temps, uniquement la partie permettant de créer des évènements indésirables.</a:t>
             </a:r>
             <a:endParaRPr lang="en-US"/>
           </a:p>
@@ -3546,6 +4014,880 @@
           </a:p>
         </p:txBody>
       </p:sp>
+    </p:spTree>
+  </p:cSld>
+  <p:clrMapOvr>
+    <a:masterClrMapping/>
+  </p:clrMapOvr>
+</p:sld>
+</file>
+
+<file path=ppt/slides/slide20.xml><?xml version="1.0" encoding="utf-8"?>
+<p:sld xmlns:a="http://schemas.openxmlformats.org/drawingml/2006/main" xmlns:r="http://schemas.openxmlformats.org/officeDocument/2006/relationships" xmlns:p="http://schemas.openxmlformats.org/presentationml/2006/main">
+  <p:cSld>
+    <p:spTree>
+      <p:nvGrpSpPr>
+        <p:cNvPr id="1" name=""/>
+        <p:cNvGrpSpPr/>
+        <p:nvPr/>
+      </p:nvGrpSpPr>
+      <p:grpSpPr/>
+      <p:sp>
+        <p:nvSpPr>
+          <p:cNvPr id="2" name="Title 1"/>
+          <p:cNvSpPr>
+            <a:spLocks noGrp="1"/>
+          </p:cNvSpPr>
+          <p:nvPr>
+            <p:ph type="title"/>
+          </p:nvPr>
+        </p:nvSpPr>
+        <p:spPr/>
+        <p:txBody>
+          <a:bodyPr/>
+          <a:p>
+            <a:pPr algn="ctr"/>
+            <a:r>
+              <a:rPr lang="fr-FR" altLang="en-US" b="1"/>
+              <a:t>MAQUETTAGE : MOCKUP</a:t>
+            </a:r>
+            <a:endParaRPr lang="fr-FR" altLang="en-US" b="1"/>
+          </a:p>
+        </p:txBody>
+      </p:sp>
+      <p:sp>
+        <p:nvSpPr>
+          <p:cNvPr id="3" name="Content Placeholder 2"/>
+          <p:cNvSpPr>
+            <a:spLocks noGrp="1"/>
+          </p:cNvSpPr>
+          <p:nvPr>
+            <p:ph idx="1"/>
+          </p:nvPr>
+        </p:nvSpPr>
+        <p:spPr>
+          <a:xfrm>
+            <a:off x="838200" y="1483360"/>
+            <a:ext cx="10515600" cy="5142230"/>
+          </a:xfrm>
+        </p:spPr>
+        <p:txBody>
+          <a:bodyPr/>
+          <a:p>
+            <a:pPr marL="0" indent="0">
+              <a:buNone/>
+            </a:pPr>
+            <a:r>
+              <a:rPr lang="fr-FR" altLang="en-US"/>
+              <a:t>LOGIN                                        ACCUEIL                               DECLARATION</a:t>
+            </a:r>
+            <a:endParaRPr lang="fr-FR" altLang="en-US"/>
+          </a:p>
+        </p:txBody>
+      </p:sp>
+      <p:pic>
+        <p:nvPicPr>
+          <p:cNvPr id="4" name="Picture 3" descr="Capture d'écran 2023-08-06 104736"/>
+          <p:cNvPicPr>
+            <a:picLocks noChangeAspect="1"/>
+          </p:cNvPicPr>
+          <p:nvPr/>
+        </p:nvPicPr>
+        <p:blipFill>
+          <a:blip r:embed="rId1"/>
+          <a:stretch>
+            <a:fillRect/>
+          </a:stretch>
+        </p:blipFill>
+        <p:spPr>
+          <a:xfrm>
+            <a:off x="143510" y="1930400"/>
+            <a:ext cx="2787015" cy="4926965"/>
+          </a:xfrm>
+          <a:prstGeom prst="rect">
+            <a:avLst/>
+          </a:prstGeom>
+        </p:spPr>
+      </p:pic>
+      <p:pic>
+        <p:nvPicPr>
+          <p:cNvPr id="6" name="Picture 5" descr="Capture d'écran 2023-08-06 104950"/>
+          <p:cNvPicPr>
+            <a:picLocks noChangeAspect="1"/>
+          </p:cNvPicPr>
+          <p:nvPr/>
+        </p:nvPicPr>
+        <p:blipFill>
+          <a:blip r:embed="rId2"/>
+          <a:stretch>
+            <a:fillRect/>
+          </a:stretch>
+        </p:blipFill>
+        <p:spPr>
+          <a:xfrm>
+            <a:off x="4385945" y="1930400"/>
+            <a:ext cx="2430780" cy="4959985"/>
+          </a:xfrm>
+          <a:prstGeom prst="rect">
+            <a:avLst/>
+          </a:prstGeom>
+        </p:spPr>
+      </p:pic>
+      <p:pic>
+        <p:nvPicPr>
+          <p:cNvPr id="7" name="Picture 6" descr="Capture d'écran 2023-08-06 104958"/>
+          <p:cNvPicPr>
+            <a:picLocks noChangeAspect="1"/>
+          </p:cNvPicPr>
+          <p:nvPr/>
+        </p:nvPicPr>
+        <p:blipFill>
+          <a:blip r:embed="rId3"/>
+          <a:stretch>
+            <a:fillRect/>
+          </a:stretch>
+        </p:blipFill>
+        <p:spPr>
+          <a:xfrm>
+            <a:off x="7719060" y="1930400"/>
+            <a:ext cx="4499610" cy="4926330"/>
+          </a:xfrm>
+          <a:prstGeom prst="rect">
+            <a:avLst/>
+          </a:prstGeom>
+        </p:spPr>
+      </p:pic>
+    </p:spTree>
+  </p:cSld>
+  <p:clrMapOvr>
+    <a:masterClrMapping/>
+  </p:clrMapOvr>
+</p:sld>
+</file>
+
+<file path=ppt/slides/slide21.xml><?xml version="1.0" encoding="utf-8"?>
+<p:sld xmlns:a="http://schemas.openxmlformats.org/drawingml/2006/main" xmlns:r="http://schemas.openxmlformats.org/officeDocument/2006/relationships" xmlns:p="http://schemas.openxmlformats.org/presentationml/2006/main">
+  <p:cSld>
+    <p:spTree>
+      <p:nvGrpSpPr>
+        <p:cNvPr id="1" name=""/>
+        <p:cNvGrpSpPr/>
+        <p:nvPr/>
+      </p:nvGrpSpPr>
+      <p:grpSpPr/>
+      <p:sp>
+        <p:nvSpPr>
+          <p:cNvPr id="2" name="Title 1"/>
+          <p:cNvSpPr>
+            <a:spLocks noGrp="1"/>
+          </p:cNvSpPr>
+          <p:nvPr>
+            <p:ph type="title"/>
+          </p:nvPr>
+        </p:nvSpPr>
+        <p:spPr/>
+        <p:txBody>
+          <a:bodyPr/>
+          <a:p>
+            <a:pPr algn="ctr"/>
+            <a:r>
+              <a:rPr lang="fr-FR" altLang="en-US"/>
+              <a:t>DECLARATION : SUITE</a:t>
+            </a:r>
+            <a:endParaRPr lang="fr-FR" altLang="en-US"/>
+          </a:p>
+        </p:txBody>
+      </p:sp>
+      <p:pic>
+        <p:nvPicPr>
+          <p:cNvPr id="4" name="Picture 3" descr="Capture d'écran 2023-08-06 105007"/>
+          <p:cNvPicPr>
+            <a:picLocks noChangeAspect="1"/>
+          </p:cNvPicPr>
+          <p:nvPr/>
+        </p:nvPicPr>
+        <p:blipFill>
+          <a:blip r:embed="rId1"/>
+          <a:stretch>
+            <a:fillRect/>
+          </a:stretch>
+        </p:blipFill>
+        <p:spPr>
+          <a:xfrm>
+            <a:off x="-69850" y="1274445"/>
+            <a:ext cx="8612505" cy="5583555"/>
+          </a:xfrm>
+          <a:prstGeom prst="rect">
+            <a:avLst/>
+          </a:prstGeom>
+        </p:spPr>
+      </p:pic>
+      <p:pic>
+        <p:nvPicPr>
+          <p:cNvPr id="5" name="Picture 4" descr="Capture d'écran 2023-08-06 105029"/>
+          <p:cNvPicPr>
+            <a:picLocks noChangeAspect="1"/>
+          </p:cNvPicPr>
+          <p:nvPr/>
+        </p:nvPicPr>
+        <p:blipFill>
+          <a:blip r:embed="rId2"/>
+          <a:stretch>
+            <a:fillRect/>
+          </a:stretch>
+        </p:blipFill>
+        <p:spPr>
+          <a:xfrm>
+            <a:off x="8964930" y="1274445"/>
+            <a:ext cx="2853690" cy="5525770"/>
+          </a:xfrm>
+          <a:prstGeom prst="rect">
+            <a:avLst/>
+          </a:prstGeom>
+        </p:spPr>
+      </p:pic>
+    </p:spTree>
+  </p:cSld>
+  <p:clrMapOvr>
+    <a:masterClrMapping/>
+  </p:clrMapOvr>
+</p:sld>
+</file>
+
+<file path=ppt/slides/slide22.xml><?xml version="1.0" encoding="utf-8"?>
+<p:sld xmlns:a="http://schemas.openxmlformats.org/drawingml/2006/main" xmlns:r="http://schemas.openxmlformats.org/officeDocument/2006/relationships" xmlns:p="http://schemas.openxmlformats.org/presentationml/2006/main">
+  <p:cSld>
+    <p:spTree>
+      <p:nvGrpSpPr>
+        <p:cNvPr id="1" name=""/>
+        <p:cNvGrpSpPr/>
+        <p:nvPr/>
+      </p:nvGrpSpPr>
+      <p:grpSpPr/>
+      <p:sp>
+        <p:nvSpPr>
+          <p:cNvPr id="2" name="Title 1"/>
+          <p:cNvSpPr>
+            <a:spLocks noGrp="1"/>
+          </p:cNvSpPr>
+          <p:nvPr>
+            <p:ph type="title"/>
+          </p:nvPr>
+        </p:nvSpPr>
+        <p:spPr/>
+        <p:txBody>
+          <a:bodyPr/>
+          <a:p>
+            <a:pPr algn="ctr"/>
+            <a:r>
+              <a:rPr lang="fr-FR" altLang="en-US"/>
+              <a:t>TRAITEMENT/DEROGATION</a:t>
+            </a:r>
+            <a:endParaRPr lang="fr-FR" altLang="en-US"/>
+          </a:p>
+        </p:txBody>
+      </p:sp>
+      <p:pic>
+        <p:nvPicPr>
+          <p:cNvPr id="4" name="Picture 3" descr="Capture d'écran 2023-08-06 105559"/>
+          <p:cNvPicPr>
+            <a:picLocks noChangeAspect="1"/>
+          </p:cNvPicPr>
+          <p:nvPr/>
+        </p:nvPicPr>
+        <p:blipFill>
+          <a:blip r:embed="rId1"/>
+          <a:stretch>
+            <a:fillRect/>
+          </a:stretch>
+        </p:blipFill>
+        <p:spPr>
+          <a:xfrm>
+            <a:off x="0" y="1443990"/>
+            <a:ext cx="2660015" cy="5292090"/>
+          </a:xfrm>
+          <a:prstGeom prst="rect">
+            <a:avLst/>
+          </a:prstGeom>
+        </p:spPr>
+      </p:pic>
+      <p:pic>
+        <p:nvPicPr>
+          <p:cNvPr id="5" name="Picture 4" descr="Capture d'écran 2023-08-06 105608"/>
+          <p:cNvPicPr>
+            <a:picLocks noChangeAspect="1"/>
+          </p:cNvPicPr>
+          <p:nvPr/>
+        </p:nvPicPr>
+        <p:blipFill>
+          <a:blip r:embed="rId2"/>
+          <a:stretch>
+            <a:fillRect/>
+          </a:stretch>
+        </p:blipFill>
+        <p:spPr>
+          <a:xfrm>
+            <a:off x="2973070" y="1443355"/>
+            <a:ext cx="8402320" cy="5292725"/>
+          </a:xfrm>
+          <a:prstGeom prst="rect">
+            <a:avLst/>
+          </a:prstGeom>
+        </p:spPr>
+      </p:pic>
+    </p:spTree>
+  </p:cSld>
+  <p:clrMapOvr>
+    <a:masterClrMapping/>
+  </p:clrMapOvr>
+</p:sld>
+</file>
+
+<file path=ppt/slides/slide23.xml><?xml version="1.0" encoding="utf-8"?>
+<p:sld xmlns:a="http://schemas.openxmlformats.org/drawingml/2006/main" xmlns:r="http://schemas.openxmlformats.org/officeDocument/2006/relationships" xmlns:p="http://schemas.openxmlformats.org/presentationml/2006/main">
+  <p:cSld>
+    <p:spTree>
+      <p:nvGrpSpPr>
+        <p:cNvPr id="1" name=""/>
+        <p:cNvGrpSpPr/>
+        <p:nvPr/>
+      </p:nvGrpSpPr>
+      <p:grpSpPr/>
+      <p:sp>
+        <p:nvSpPr>
+          <p:cNvPr id="2" name="Title 1"/>
+          <p:cNvSpPr>
+            <a:spLocks noGrp="1"/>
+          </p:cNvSpPr>
+          <p:nvPr>
+            <p:ph type="title"/>
+          </p:nvPr>
+        </p:nvSpPr>
+        <p:spPr/>
+        <p:txBody>
+          <a:bodyPr/>
+          <a:p>
+            <a:pPr algn="ctr"/>
+            <a:r>
+              <a:rPr lang="fr-FR" altLang="en-US"/>
+              <a:t>DEROGATION : SUITE</a:t>
+            </a:r>
+            <a:endParaRPr lang="fr-FR" altLang="en-US"/>
+          </a:p>
+        </p:txBody>
+      </p:sp>
+      <p:pic>
+        <p:nvPicPr>
+          <p:cNvPr id="4" name="Picture 3" descr="Capture d'écran 2023-08-06 105617"/>
+          <p:cNvPicPr>
+            <a:picLocks noChangeAspect="1"/>
+          </p:cNvPicPr>
+          <p:nvPr/>
+        </p:nvPicPr>
+        <p:blipFill>
+          <a:blip r:embed="rId1"/>
+          <a:stretch>
+            <a:fillRect/>
+          </a:stretch>
+        </p:blipFill>
+        <p:spPr>
+          <a:xfrm>
+            <a:off x="3460750" y="1209675"/>
+            <a:ext cx="5723890" cy="5515610"/>
+          </a:xfrm>
+          <a:prstGeom prst="rect">
+            <a:avLst/>
+          </a:prstGeom>
+        </p:spPr>
+      </p:pic>
+    </p:spTree>
+  </p:cSld>
+  <p:clrMapOvr>
+    <a:masterClrMapping/>
+  </p:clrMapOvr>
+</p:sld>
+</file>
+
+<file path=ppt/slides/slide24.xml><?xml version="1.0" encoding="utf-8"?>
+<p:sld xmlns:a="http://schemas.openxmlformats.org/drawingml/2006/main" xmlns:r="http://schemas.openxmlformats.org/officeDocument/2006/relationships" xmlns:p="http://schemas.openxmlformats.org/presentationml/2006/main">
+  <p:cSld>
+    <p:spTree>
+      <p:nvGrpSpPr>
+        <p:cNvPr id="1" name=""/>
+        <p:cNvGrpSpPr/>
+        <p:nvPr/>
+      </p:nvGrpSpPr>
+      <p:grpSpPr/>
+      <p:sp>
+        <p:nvSpPr>
+          <p:cNvPr id="2" name="Title 1"/>
+          <p:cNvSpPr>
+            <a:spLocks noGrp="1"/>
+          </p:cNvSpPr>
+          <p:nvPr>
+            <p:ph type="title"/>
+          </p:nvPr>
+        </p:nvSpPr>
+        <p:spPr/>
+        <p:txBody>
+          <a:bodyPr/>
+          <a:p>
+            <a:pPr algn="ctr"/>
+            <a:r>
+              <a:rPr lang="fr-FR" altLang="en-US"/>
+              <a:t>ENREGISTREMENT</a:t>
+            </a:r>
+            <a:endParaRPr lang="fr-FR" altLang="en-US"/>
+          </a:p>
+        </p:txBody>
+      </p:sp>
+      <p:pic>
+        <p:nvPicPr>
+          <p:cNvPr id="4" name="Picture 3" descr="Capture d'écran 2023-08-06 105832"/>
+          <p:cNvPicPr>
+            <a:picLocks noChangeAspect="1"/>
+          </p:cNvPicPr>
+          <p:nvPr/>
+        </p:nvPicPr>
+        <p:blipFill>
+          <a:blip r:embed="rId1"/>
+          <a:stretch>
+            <a:fillRect/>
+          </a:stretch>
+        </p:blipFill>
+        <p:spPr>
+          <a:xfrm>
+            <a:off x="3232150" y="1283970"/>
+            <a:ext cx="6021070" cy="5365115"/>
+          </a:xfrm>
+          <a:prstGeom prst="rect">
+            <a:avLst/>
+          </a:prstGeom>
+        </p:spPr>
+      </p:pic>
+    </p:spTree>
+  </p:cSld>
+  <p:clrMapOvr>
+    <a:masterClrMapping/>
+  </p:clrMapOvr>
+</p:sld>
+</file>
+
+<file path=ppt/slides/slide25.xml><?xml version="1.0" encoding="utf-8"?>
+<p:sld xmlns:a="http://schemas.openxmlformats.org/drawingml/2006/main" xmlns:r="http://schemas.openxmlformats.org/officeDocument/2006/relationships" xmlns:p="http://schemas.openxmlformats.org/presentationml/2006/main">
+  <p:cSld>
+    <p:spTree>
+      <p:nvGrpSpPr>
+        <p:cNvPr id="1" name=""/>
+        <p:cNvGrpSpPr/>
+        <p:nvPr/>
+      </p:nvGrpSpPr>
+      <p:grpSpPr/>
+      <p:sp>
+        <p:nvSpPr>
+          <p:cNvPr id="2" name="Title 1"/>
+          <p:cNvSpPr>
+            <a:spLocks noGrp="1"/>
+          </p:cNvSpPr>
+          <p:nvPr>
+            <p:ph type="title"/>
+          </p:nvPr>
+        </p:nvSpPr>
+        <p:spPr/>
+        <p:txBody>
+          <a:bodyPr/>
+          <a:p>
+            <a:r>
+              <a:rPr lang="fr-FR" altLang="en-US"/>
+              <a:t>UML : Diagramme de cas d’utilisation</a:t>
+            </a:r>
+            <a:endParaRPr lang="fr-FR" altLang="en-US"/>
+          </a:p>
+        </p:txBody>
+      </p:sp>
+      <p:sp>
+        <p:nvSpPr>
+          <p:cNvPr id="3" name="Content Placeholder 2"/>
+          <p:cNvSpPr>
+            <a:spLocks noGrp="1"/>
+          </p:cNvSpPr>
+          <p:nvPr>
+            <p:ph idx="1"/>
+          </p:nvPr>
+        </p:nvSpPr>
+        <p:spPr/>
+        <p:txBody>
+          <a:bodyPr/>
+          <a:p>
+            <a:endParaRPr lang="en-US"/>
+          </a:p>
+        </p:txBody>
+      </p:sp>
+      <p:pic>
+        <p:nvPicPr>
+          <p:cNvPr id="4" name="Picture 3" descr="Capture d'écran 2023-08-06 110402"/>
+          <p:cNvPicPr>
+            <a:picLocks noChangeAspect="1"/>
+          </p:cNvPicPr>
+          <p:nvPr/>
+        </p:nvPicPr>
+        <p:blipFill>
+          <a:blip r:embed="rId1"/>
+          <a:stretch>
+            <a:fillRect/>
+          </a:stretch>
+        </p:blipFill>
+        <p:spPr>
+          <a:xfrm>
+            <a:off x="744220" y="1531620"/>
+            <a:ext cx="11178540" cy="5135880"/>
+          </a:xfrm>
+          <a:prstGeom prst="rect">
+            <a:avLst/>
+          </a:prstGeom>
+        </p:spPr>
+      </p:pic>
+    </p:spTree>
+  </p:cSld>
+  <p:clrMapOvr>
+    <a:masterClrMapping/>
+  </p:clrMapOvr>
+</p:sld>
+</file>
+
+<file path=ppt/slides/slide26.xml><?xml version="1.0" encoding="utf-8"?>
+<p:sld xmlns:a="http://schemas.openxmlformats.org/drawingml/2006/main" xmlns:r="http://schemas.openxmlformats.org/officeDocument/2006/relationships" xmlns:p="http://schemas.openxmlformats.org/presentationml/2006/main">
+  <p:cSld>
+    <p:spTree>
+      <p:nvGrpSpPr>
+        <p:cNvPr id="1" name=""/>
+        <p:cNvGrpSpPr/>
+        <p:nvPr/>
+      </p:nvGrpSpPr>
+      <p:grpSpPr/>
+      <p:sp>
+        <p:nvSpPr>
+          <p:cNvPr id="2" name="Title 1"/>
+          <p:cNvSpPr>
+            <a:spLocks noGrp="1"/>
+          </p:cNvSpPr>
+          <p:nvPr>
+            <p:ph type="title"/>
+          </p:nvPr>
+        </p:nvSpPr>
+        <p:spPr/>
+        <p:txBody>
+          <a:bodyPr/>
+          <a:p>
+            <a:r>
+              <a:rPr lang="fr-FR" altLang="en-US"/>
+              <a:t>UML : Diagramme d’activité : connexion</a:t>
+            </a:r>
+            <a:endParaRPr lang="fr-FR" altLang="en-US"/>
+          </a:p>
+        </p:txBody>
+      </p:sp>
+      <p:sp>
+        <p:nvSpPr>
+          <p:cNvPr id="3" name="Content Placeholder 2"/>
+          <p:cNvSpPr>
+            <a:spLocks noGrp="1"/>
+          </p:cNvSpPr>
+          <p:nvPr>
+            <p:ph idx="1"/>
+          </p:nvPr>
+        </p:nvSpPr>
+        <p:spPr/>
+        <p:txBody>
+          <a:bodyPr/>
+          <a:p>
+            <a:endParaRPr lang="en-US"/>
+          </a:p>
+        </p:txBody>
+      </p:sp>
+      <p:pic>
+        <p:nvPicPr>
+          <p:cNvPr id="4" name="Picture 3" descr="Capture d'écran 2023-08-06 110503"/>
+          <p:cNvPicPr>
+            <a:picLocks noChangeAspect="1"/>
+          </p:cNvPicPr>
+          <p:nvPr/>
+        </p:nvPicPr>
+        <p:blipFill>
+          <a:blip r:embed="rId1"/>
+          <a:stretch>
+            <a:fillRect/>
+          </a:stretch>
+        </p:blipFill>
+        <p:spPr>
+          <a:xfrm>
+            <a:off x="838200" y="1393825"/>
+            <a:ext cx="9893300" cy="5215255"/>
+          </a:xfrm>
+          <a:prstGeom prst="rect">
+            <a:avLst/>
+          </a:prstGeom>
+        </p:spPr>
+      </p:pic>
+    </p:spTree>
+  </p:cSld>
+  <p:clrMapOvr>
+    <a:masterClrMapping/>
+  </p:clrMapOvr>
+</p:sld>
+</file>
+
+<file path=ppt/slides/slide27.xml><?xml version="1.0" encoding="utf-8"?>
+<p:sld xmlns:a="http://schemas.openxmlformats.org/drawingml/2006/main" xmlns:r="http://schemas.openxmlformats.org/officeDocument/2006/relationships" xmlns:p="http://schemas.openxmlformats.org/presentationml/2006/main">
+  <p:cSld>
+    <p:spTree>
+      <p:nvGrpSpPr>
+        <p:cNvPr id="1" name=""/>
+        <p:cNvGrpSpPr/>
+        <p:nvPr/>
+      </p:nvGrpSpPr>
+      <p:grpSpPr/>
+      <p:sp>
+        <p:nvSpPr>
+          <p:cNvPr id="2" name="Title 1"/>
+          <p:cNvSpPr>
+            <a:spLocks noGrp="1"/>
+          </p:cNvSpPr>
+          <p:nvPr>
+            <p:ph type="title"/>
+          </p:nvPr>
+        </p:nvSpPr>
+        <p:spPr/>
+        <p:txBody>
+          <a:bodyPr>
+            <a:normAutofit fontScale="90000"/>
+          </a:bodyPr>
+          <a:p>
+            <a:r>
+              <a:rPr lang="fr-FR" altLang="en-US">
+                <a:sym typeface="+mn-ea"/>
+              </a:rPr>
+              <a:t>UML : Diagramme séquence : connexion</a:t>
+            </a:r>
+            <a:br>
+              <a:rPr lang="fr-FR" altLang="en-US"/>
+            </a:br>
+            <a:endParaRPr lang="en-US"/>
+          </a:p>
+        </p:txBody>
+      </p:sp>
+      <p:pic>
+        <p:nvPicPr>
+          <p:cNvPr id="4" name="Picture 3" descr="Capture d'écran 2023-08-06 110632"/>
+          <p:cNvPicPr>
+            <a:picLocks noChangeAspect="1"/>
+          </p:cNvPicPr>
+          <p:nvPr/>
+        </p:nvPicPr>
+        <p:blipFill>
+          <a:blip r:embed="rId1"/>
+          <a:stretch>
+            <a:fillRect/>
+          </a:stretch>
+        </p:blipFill>
+        <p:spPr>
+          <a:xfrm>
+            <a:off x="1163320" y="1033780"/>
+            <a:ext cx="9546590" cy="5706110"/>
+          </a:xfrm>
+          <a:prstGeom prst="rect">
+            <a:avLst/>
+          </a:prstGeom>
+        </p:spPr>
+      </p:pic>
+    </p:spTree>
+  </p:cSld>
+  <p:clrMapOvr>
+    <a:masterClrMapping/>
+  </p:clrMapOvr>
+</p:sld>
+</file>
+
+<file path=ppt/slides/slide28.xml><?xml version="1.0" encoding="utf-8"?>
+<p:sld xmlns:a="http://schemas.openxmlformats.org/drawingml/2006/main" xmlns:r="http://schemas.openxmlformats.org/officeDocument/2006/relationships" xmlns:p="http://schemas.openxmlformats.org/presentationml/2006/main">
+  <p:cSld>
+    <p:spTree>
+      <p:nvGrpSpPr>
+        <p:cNvPr id="1" name=""/>
+        <p:cNvGrpSpPr/>
+        <p:nvPr/>
+      </p:nvGrpSpPr>
+      <p:grpSpPr/>
+      <p:sp>
+        <p:nvSpPr>
+          <p:cNvPr id="2" name="Title 1"/>
+          <p:cNvSpPr>
+            <a:spLocks noGrp="1"/>
+          </p:cNvSpPr>
+          <p:nvPr>
+            <p:ph type="title"/>
+          </p:nvPr>
+        </p:nvSpPr>
+        <p:spPr/>
+        <p:txBody>
+          <a:bodyPr>
+            <a:normAutofit fontScale="90000"/>
+          </a:bodyPr>
+          <a:p>
+            <a:r>
+              <a:rPr lang="fr-FR" altLang="en-US">
+                <a:sym typeface="+mn-ea"/>
+              </a:rPr>
+              <a:t>UML : Diagramme d’activité : Créer évènement</a:t>
+            </a:r>
+            <a:endParaRPr lang="en-US"/>
+          </a:p>
+        </p:txBody>
+      </p:sp>
+      <p:pic>
+        <p:nvPicPr>
+          <p:cNvPr id="7" name="Picture 6" descr="Capture d'écran 2023-08-06 110818"/>
+          <p:cNvPicPr>
+            <a:picLocks noChangeAspect="1"/>
+          </p:cNvPicPr>
+          <p:nvPr/>
+        </p:nvPicPr>
+        <p:blipFill>
+          <a:blip r:embed="rId1"/>
+          <a:stretch>
+            <a:fillRect/>
+          </a:stretch>
+        </p:blipFill>
+        <p:spPr>
+          <a:xfrm>
+            <a:off x="0" y="1231265"/>
+            <a:ext cx="6540500" cy="5626735"/>
+          </a:xfrm>
+          <a:prstGeom prst="rect">
+            <a:avLst/>
+          </a:prstGeom>
+        </p:spPr>
+      </p:pic>
+      <p:pic>
+        <p:nvPicPr>
+          <p:cNvPr id="8" name="Picture 7" descr="Capture d'écran 2023-08-06 110829"/>
+          <p:cNvPicPr>
+            <a:picLocks noChangeAspect="1"/>
+          </p:cNvPicPr>
+          <p:nvPr/>
+        </p:nvPicPr>
+        <p:blipFill>
+          <a:blip r:embed="rId2"/>
+          <a:stretch>
+            <a:fillRect/>
+          </a:stretch>
+        </p:blipFill>
+        <p:spPr>
+          <a:xfrm>
+            <a:off x="6456680" y="1231265"/>
+            <a:ext cx="5680710" cy="5751830"/>
+          </a:xfrm>
+          <a:prstGeom prst="rect">
+            <a:avLst/>
+          </a:prstGeom>
+        </p:spPr>
+      </p:pic>
+      <p:sp>
+        <p:nvSpPr>
+          <p:cNvPr id="9" name="Text Box 8"/>
+          <p:cNvSpPr txBox="1"/>
+          <p:nvPr/>
+        </p:nvSpPr>
+        <p:spPr>
+          <a:xfrm>
+            <a:off x="10556240" y="973455"/>
+            <a:ext cx="309880" cy="368300"/>
+          </a:xfrm>
+          <a:prstGeom prst="rect">
+            <a:avLst/>
+          </a:prstGeom>
+          <a:noFill/>
+        </p:spPr>
+        <p:txBody>
+          <a:bodyPr wrap="none" rtlCol="0">
+            <a:spAutoFit/>
+          </a:bodyPr>
+          <a:p>
+            <a:endParaRPr lang="en-US"/>
+          </a:p>
+        </p:txBody>
+      </p:sp>
+    </p:spTree>
+  </p:cSld>
+  <p:clrMapOvr>
+    <a:masterClrMapping/>
+  </p:clrMapOvr>
+</p:sld>
+</file>
+
+<file path=ppt/slides/slide29.xml><?xml version="1.0" encoding="utf-8"?>
+<p:sld xmlns:a="http://schemas.openxmlformats.org/drawingml/2006/main" xmlns:r="http://schemas.openxmlformats.org/officeDocument/2006/relationships" xmlns:p="http://schemas.openxmlformats.org/presentationml/2006/main">
+  <p:cSld>
+    <p:spTree>
+      <p:nvGrpSpPr>
+        <p:cNvPr id="1" name=""/>
+        <p:cNvGrpSpPr/>
+        <p:nvPr/>
+      </p:nvGrpSpPr>
+      <p:grpSpPr/>
+      <p:sp>
+        <p:nvSpPr>
+          <p:cNvPr id="2" name="Title 1"/>
+          <p:cNvSpPr>
+            <a:spLocks noGrp="1"/>
+          </p:cNvSpPr>
+          <p:nvPr>
+            <p:ph type="title"/>
+          </p:nvPr>
+        </p:nvSpPr>
+        <p:spPr/>
+        <p:txBody>
+          <a:bodyPr>
+            <a:normAutofit fontScale="90000"/>
+          </a:bodyPr>
+          <a:p>
+            <a:r>
+              <a:rPr lang="fr-FR" altLang="en-US">
+                <a:sym typeface="+mn-ea"/>
+              </a:rPr>
+              <a:t>UML : Diagramme séquence : Créer évènement</a:t>
+            </a:r>
+            <a:br>
+              <a:rPr lang="en-US"/>
+            </a:br>
+            <a:endParaRPr lang="en-US"/>
+          </a:p>
+        </p:txBody>
+      </p:sp>
+      <p:pic>
+        <p:nvPicPr>
+          <p:cNvPr id="4" name="Picture 3" descr="Capture d'écran 2023-08-06 111102"/>
+          <p:cNvPicPr>
+            <a:picLocks noChangeAspect="1"/>
+          </p:cNvPicPr>
+          <p:nvPr/>
+        </p:nvPicPr>
+        <p:blipFill>
+          <a:blip r:embed="rId1"/>
+          <a:stretch>
+            <a:fillRect/>
+          </a:stretch>
+        </p:blipFill>
+        <p:spPr>
+          <a:xfrm>
+            <a:off x="2045335" y="949325"/>
+            <a:ext cx="7863205" cy="5908675"/>
+          </a:xfrm>
+          <a:prstGeom prst="rect">
+            <a:avLst/>
+          </a:prstGeom>
+        </p:spPr>
+      </p:pic>
     </p:spTree>
   </p:cSld>
   <p:clrMapOvr>
@@ -3555,6 +4897,666 @@
 </file>
 
 <file path=ppt/slides/slide3.xml><?xml version="1.0" encoding="utf-8"?>
+<p:sld xmlns:a="http://schemas.openxmlformats.org/drawingml/2006/main" xmlns:r="http://schemas.openxmlformats.org/officeDocument/2006/relationships" xmlns:p="http://schemas.openxmlformats.org/presentationml/2006/main">
+  <p:cSld>
+    <p:spTree>
+      <p:nvGrpSpPr>
+        <p:cNvPr id="1" name=""/>
+        <p:cNvGrpSpPr/>
+        <p:nvPr/>
+      </p:nvGrpSpPr>
+      <p:grpSpPr/>
+      <p:sp>
+        <p:nvSpPr>
+          <p:cNvPr id="2" name="Title 1"/>
+          <p:cNvSpPr>
+            <a:spLocks noGrp="1"/>
+          </p:cNvSpPr>
+          <p:nvPr>
+            <p:ph type="title"/>
+          </p:nvPr>
+        </p:nvSpPr>
+        <p:spPr/>
+        <p:txBody>
+          <a:bodyPr/>
+          <a:p>
+            <a:pPr algn="ctr"/>
+            <a:r>
+              <a:rPr lang="fr-FR" altLang="en-US" b="1"/>
+              <a:t>Objectifs de l’application :</a:t>
+            </a:r>
+            <a:endParaRPr lang="fr-FR" altLang="en-US" b="1"/>
+          </a:p>
+        </p:txBody>
+      </p:sp>
+      <p:sp>
+        <p:nvSpPr>
+          <p:cNvPr id="3" name="Content Placeholder 2"/>
+          <p:cNvSpPr>
+            <a:spLocks noGrp="1"/>
+          </p:cNvSpPr>
+          <p:nvPr>
+            <p:ph idx="1"/>
+          </p:nvPr>
+        </p:nvSpPr>
+        <p:spPr/>
+        <p:txBody>
+          <a:bodyPr/>
+          <a:p>
+            <a:r>
+              <a:rPr lang="fr-FR" altLang="en-US"/>
+              <a:t>Tout simplement de faciliter davantage pour leurs clients la déclaration d’évènement indésirables.</a:t>
+            </a:r>
+            <a:endParaRPr lang="fr-FR" altLang="en-US"/>
+          </a:p>
+        </p:txBody>
+      </p:sp>
+    </p:spTree>
+  </p:cSld>
+  <p:clrMapOvr>
+    <a:masterClrMapping/>
+  </p:clrMapOvr>
+</p:sld>
+</file>
+
+<file path=ppt/slides/slide30.xml><?xml version="1.0" encoding="utf-8"?>
+<p:sld xmlns:a="http://schemas.openxmlformats.org/drawingml/2006/main" xmlns:r="http://schemas.openxmlformats.org/officeDocument/2006/relationships" xmlns:p="http://schemas.openxmlformats.org/presentationml/2006/main">
+  <p:cSld>
+    <p:spTree>
+      <p:nvGrpSpPr>
+        <p:cNvPr id="1" name=""/>
+        <p:cNvGrpSpPr/>
+        <p:nvPr/>
+      </p:nvGrpSpPr>
+      <p:grpSpPr/>
+      <p:sp>
+        <p:nvSpPr>
+          <p:cNvPr id="2" name="Title 1"/>
+          <p:cNvSpPr>
+            <a:spLocks noGrp="1"/>
+          </p:cNvSpPr>
+          <p:nvPr>
+            <p:ph type="title"/>
+          </p:nvPr>
+        </p:nvSpPr>
+        <p:spPr/>
+        <p:txBody>
+          <a:bodyPr/>
+          <a:p>
+            <a:pPr algn="ctr"/>
+            <a:r>
+              <a:rPr lang="fr-FR" altLang="en-US" b="1"/>
+              <a:t>MCD</a:t>
+            </a:r>
+            <a:endParaRPr lang="fr-FR" altLang="en-US" b="1"/>
+          </a:p>
+        </p:txBody>
+      </p:sp>
+      <p:pic>
+        <p:nvPicPr>
+          <p:cNvPr id="4" name="Picture 3" descr="Capture d'écran 2023-08-06 111205"/>
+          <p:cNvPicPr>
+            <a:picLocks noChangeAspect="1"/>
+          </p:cNvPicPr>
+          <p:nvPr/>
+        </p:nvPicPr>
+        <p:blipFill>
+          <a:blip r:embed="rId1"/>
+          <a:stretch>
+            <a:fillRect/>
+          </a:stretch>
+        </p:blipFill>
+        <p:spPr>
+          <a:xfrm>
+            <a:off x="1577340" y="1292225"/>
+            <a:ext cx="9776460" cy="5486400"/>
+          </a:xfrm>
+          <a:prstGeom prst="rect">
+            <a:avLst/>
+          </a:prstGeom>
+        </p:spPr>
+      </p:pic>
+    </p:spTree>
+  </p:cSld>
+  <p:clrMapOvr>
+    <a:masterClrMapping/>
+  </p:clrMapOvr>
+</p:sld>
+</file>
+
+<file path=ppt/slides/slide31.xml><?xml version="1.0" encoding="utf-8"?>
+<p:sld xmlns:a="http://schemas.openxmlformats.org/drawingml/2006/main" xmlns:r="http://schemas.openxmlformats.org/officeDocument/2006/relationships" xmlns:p="http://schemas.openxmlformats.org/presentationml/2006/main">
+  <p:cSld>
+    <p:spTree>
+      <p:nvGrpSpPr>
+        <p:cNvPr id="1" name=""/>
+        <p:cNvGrpSpPr/>
+        <p:nvPr/>
+      </p:nvGrpSpPr>
+      <p:grpSpPr/>
+      <p:sp>
+        <p:nvSpPr>
+          <p:cNvPr id="2" name="Title 1"/>
+          <p:cNvSpPr>
+            <a:spLocks noGrp="1"/>
+          </p:cNvSpPr>
+          <p:nvPr>
+            <p:ph type="title"/>
+          </p:nvPr>
+        </p:nvSpPr>
+        <p:spPr/>
+        <p:txBody>
+          <a:bodyPr/>
+          <a:p>
+            <a:pPr algn="ctr"/>
+            <a:r>
+              <a:rPr lang="fr-FR" altLang="en-US" b="1"/>
+              <a:t>MLD</a:t>
+            </a:r>
+            <a:endParaRPr lang="fr-FR" altLang="en-US" b="1"/>
+          </a:p>
+        </p:txBody>
+      </p:sp>
+      <p:pic>
+        <p:nvPicPr>
+          <p:cNvPr id="4" name="Picture 3" descr="Capture d'écran 2023-08-06 111218"/>
+          <p:cNvPicPr>
+            <a:picLocks noChangeAspect="1"/>
+          </p:cNvPicPr>
+          <p:nvPr/>
+        </p:nvPicPr>
+        <p:blipFill>
+          <a:blip r:embed="rId1"/>
+          <a:stretch>
+            <a:fillRect/>
+          </a:stretch>
+        </p:blipFill>
+        <p:spPr>
+          <a:xfrm>
+            <a:off x="2075815" y="1245235"/>
+            <a:ext cx="8831580" cy="5513705"/>
+          </a:xfrm>
+          <a:prstGeom prst="rect">
+            <a:avLst/>
+          </a:prstGeom>
+        </p:spPr>
+      </p:pic>
+    </p:spTree>
+  </p:cSld>
+  <p:clrMapOvr>
+    <a:masterClrMapping/>
+  </p:clrMapOvr>
+</p:sld>
+</file>
+
+<file path=ppt/slides/slide32.xml><?xml version="1.0" encoding="utf-8"?>
+<p:sld xmlns:a="http://schemas.openxmlformats.org/drawingml/2006/main" xmlns:r="http://schemas.openxmlformats.org/officeDocument/2006/relationships" xmlns:p="http://schemas.openxmlformats.org/presentationml/2006/main">
+  <p:cSld>
+    <p:spTree>
+      <p:nvGrpSpPr>
+        <p:cNvPr id="1" name=""/>
+        <p:cNvGrpSpPr/>
+        <p:nvPr/>
+      </p:nvGrpSpPr>
+      <p:grpSpPr/>
+      <p:sp>
+        <p:nvSpPr>
+          <p:cNvPr id="2" name="Title 1"/>
+          <p:cNvSpPr>
+            <a:spLocks noGrp="1"/>
+          </p:cNvSpPr>
+          <p:nvPr>
+            <p:ph type="title"/>
+          </p:nvPr>
+        </p:nvSpPr>
+        <p:spPr/>
+        <p:txBody>
+          <a:bodyPr/>
+          <a:p>
+            <a:pPr algn="ctr"/>
+            <a:r>
+              <a:rPr lang="fr-FR" altLang="en-US" b="1"/>
+              <a:t>WORKBENCH</a:t>
+            </a:r>
+            <a:endParaRPr lang="fr-FR" altLang="en-US" b="1"/>
+          </a:p>
+        </p:txBody>
+      </p:sp>
+      <p:pic>
+        <p:nvPicPr>
+          <p:cNvPr id="4" name="Picture 3" descr="Capture d'écran 2023-08-06 111638"/>
+          <p:cNvPicPr>
+            <a:picLocks noChangeAspect="1"/>
+          </p:cNvPicPr>
+          <p:nvPr/>
+        </p:nvPicPr>
+        <p:blipFill>
+          <a:blip r:embed="rId1"/>
+          <a:stretch>
+            <a:fillRect/>
+          </a:stretch>
+        </p:blipFill>
+        <p:spPr>
+          <a:xfrm>
+            <a:off x="0" y="1166495"/>
+            <a:ext cx="4658995" cy="5691505"/>
+          </a:xfrm>
+          <a:prstGeom prst="rect">
+            <a:avLst/>
+          </a:prstGeom>
+        </p:spPr>
+      </p:pic>
+      <p:pic>
+        <p:nvPicPr>
+          <p:cNvPr id="5" name="Picture 4" descr="Capture d'écran 2023-08-06 111653"/>
+          <p:cNvPicPr>
+            <a:picLocks noChangeAspect="1"/>
+          </p:cNvPicPr>
+          <p:nvPr/>
+        </p:nvPicPr>
+        <p:blipFill>
+          <a:blip r:embed="rId2"/>
+          <a:stretch>
+            <a:fillRect/>
+          </a:stretch>
+        </p:blipFill>
+        <p:spPr>
+          <a:xfrm>
+            <a:off x="7661275" y="1167130"/>
+            <a:ext cx="4530725" cy="5690870"/>
+          </a:xfrm>
+          <a:prstGeom prst="rect">
+            <a:avLst/>
+          </a:prstGeom>
+        </p:spPr>
+      </p:pic>
+    </p:spTree>
+  </p:cSld>
+  <p:clrMapOvr>
+    <a:masterClrMapping/>
+  </p:clrMapOvr>
+</p:sld>
+</file>
+
+<file path=ppt/slides/slide33.xml><?xml version="1.0" encoding="utf-8"?>
+<p:sld xmlns:a="http://schemas.openxmlformats.org/drawingml/2006/main" xmlns:r="http://schemas.openxmlformats.org/officeDocument/2006/relationships" xmlns:p="http://schemas.openxmlformats.org/presentationml/2006/main">
+  <p:cSld>
+    <p:spTree>
+      <p:nvGrpSpPr>
+        <p:cNvPr id="1" name=""/>
+        <p:cNvGrpSpPr/>
+        <p:nvPr/>
+      </p:nvGrpSpPr>
+      <p:grpSpPr/>
+      <p:sp>
+        <p:nvSpPr>
+          <p:cNvPr id="2" name="Title 1"/>
+          <p:cNvSpPr>
+            <a:spLocks noGrp="1"/>
+          </p:cNvSpPr>
+          <p:nvPr>
+            <p:ph type="title"/>
+          </p:nvPr>
+        </p:nvSpPr>
+        <p:spPr/>
+        <p:txBody>
+          <a:bodyPr/>
+          <a:p>
+            <a:pPr algn="ctr"/>
+            <a:r>
+              <a:rPr lang="fr-FR" altLang="en-US" b="1"/>
+              <a:t>SQL</a:t>
+            </a:r>
+            <a:endParaRPr lang="fr-FR" altLang="en-US" b="1"/>
+          </a:p>
+        </p:txBody>
+      </p:sp>
+      <p:pic>
+        <p:nvPicPr>
+          <p:cNvPr id="4" name="Picture 3" descr="Capture d'écran 2023-08-06 111504"/>
+          <p:cNvPicPr>
+            <a:picLocks noChangeAspect="1"/>
+          </p:cNvPicPr>
+          <p:nvPr/>
+        </p:nvPicPr>
+        <p:blipFill>
+          <a:blip r:embed="rId1"/>
+          <a:stretch>
+            <a:fillRect/>
+          </a:stretch>
+        </p:blipFill>
+        <p:spPr>
+          <a:xfrm>
+            <a:off x="53340" y="1550035"/>
+            <a:ext cx="4207510" cy="4262755"/>
+          </a:xfrm>
+          <a:prstGeom prst="rect">
+            <a:avLst/>
+          </a:prstGeom>
+        </p:spPr>
+      </p:pic>
+      <p:pic>
+        <p:nvPicPr>
+          <p:cNvPr id="5" name="Picture 4" descr="Capture d'écran 2023-08-06 111513"/>
+          <p:cNvPicPr>
+            <a:picLocks noChangeAspect="1"/>
+          </p:cNvPicPr>
+          <p:nvPr/>
+        </p:nvPicPr>
+        <p:blipFill>
+          <a:blip r:embed="rId2"/>
+          <a:stretch>
+            <a:fillRect/>
+          </a:stretch>
+        </p:blipFill>
+        <p:spPr>
+          <a:xfrm>
+            <a:off x="4351020" y="1804035"/>
+            <a:ext cx="7660640" cy="3249295"/>
+          </a:xfrm>
+          <a:prstGeom prst="rect">
+            <a:avLst/>
+          </a:prstGeom>
+        </p:spPr>
+      </p:pic>
+    </p:spTree>
+  </p:cSld>
+  <p:clrMapOvr>
+    <a:masterClrMapping/>
+  </p:clrMapOvr>
+</p:sld>
+</file>
+
+<file path=ppt/slides/slide4.xml><?xml version="1.0" encoding="utf-8"?>
+<p:sld xmlns:a="http://schemas.openxmlformats.org/drawingml/2006/main" xmlns:r="http://schemas.openxmlformats.org/officeDocument/2006/relationships" xmlns:p="http://schemas.openxmlformats.org/presentationml/2006/main">
+  <p:cSld>
+    <p:spTree>
+      <p:nvGrpSpPr>
+        <p:cNvPr id="1" name=""/>
+        <p:cNvGrpSpPr/>
+        <p:nvPr/>
+      </p:nvGrpSpPr>
+      <p:grpSpPr/>
+      <p:sp>
+        <p:nvSpPr>
+          <p:cNvPr id="2" name="Title 1"/>
+          <p:cNvSpPr>
+            <a:spLocks noGrp="1"/>
+          </p:cNvSpPr>
+          <p:nvPr>
+            <p:ph type="title"/>
+          </p:nvPr>
+        </p:nvSpPr>
+        <p:spPr/>
+        <p:txBody>
+          <a:bodyPr/>
+          <a:p>
+            <a:pPr algn="ctr"/>
+            <a:r>
+              <a:rPr lang="fr-FR" altLang="en-US" b="1"/>
+              <a:t>Persona:</a:t>
+            </a:r>
+            <a:endParaRPr lang="fr-FR" altLang="en-US" b="1"/>
+          </a:p>
+        </p:txBody>
+      </p:sp>
+      <p:sp>
+        <p:nvSpPr>
+          <p:cNvPr id="3" name="Content Placeholder 2"/>
+          <p:cNvSpPr>
+            <a:spLocks noGrp="1"/>
+          </p:cNvSpPr>
+          <p:nvPr>
+            <p:ph idx="1"/>
+          </p:nvPr>
+        </p:nvSpPr>
+        <p:spPr/>
+        <p:txBody>
+          <a:bodyPr/>
+          <a:p>
+            <a:r>
+              <a:rPr lang="fr-FR" altLang="en-US"/>
+              <a:t>Ce sont tous les c</a:t>
+            </a:r>
+            <a:r>
+              <a:rPr lang="en-US"/>
+              <a:t>entre</a:t>
+            </a:r>
+            <a:r>
+              <a:rPr lang="fr-FR" altLang="en-US"/>
+              <a:t>s</a:t>
+            </a:r>
+            <a:r>
+              <a:rPr lang="en-US"/>
+              <a:t> d’imagerie</a:t>
+            </a:r>
+            <a:r>
+              <a:rPr lang="fr-FR" altLang="en-US"/>
+              <a:t>s</a:t>
+            </a:r>
+            <a:r>
+              <a:rPr lang="en-US"/>
+              <a:t> parce qu’ils ont des normes à respecter et il leur faut un logiciel de management de la qualité. </a:t>
+            </a:r>
+            <a:endParaRPr lang="en-US"/>
+          </a:p>
+        </p:txBody>
+      </p:sp>
+    </p:spTree>
+  </p:cSld>
+  <p:clrMapOvr>
+    <a:masterClrMapping/>
+  </p:clrMapOvr>
+</p:sld>
+</file>
+
+<file path=ppt/slides/slide5.xml><?xml version="1.0" encoding="utf-8"?>
+<p:sld xmlns:a="http://schemas.openxmlformats.org/drawingml/2006/main" xmlns:r="http://schemas.openxmlformats.org/officeDocument/2006/relationships" xmlns:p="http://schemas.openxmlformats.org/presentationml/2006/main">
+  <p:cSld>
+    <p:spTree>
+      <p:nvGrpSpPr>
+        <p:cNvPr id="1" name=""/>
+        <p:cNvGrpSpPr/>
+        <p:nvPr/>
+      </p:nvGrpSpPr>
+      <p:grpSpPr/>
+      <p:sp>
+        <p:nvSpPr>
+          <p:cNvPr id="2" name="Title 1"/>
+          <p:cNvSpPr>
+            <a:spLocks noGrp="1"/>
+          </p:cNvSpPr>
+          <p:nvPr>
+            <p:ph type="title"/>
+          </p:nvPr>
+        </p:nvSpPr>
+        <p:spPr/>
+        <p:txBody>
+          <a:bodyPr/>
+          <a:p>
+            <a:pPr algn="ctr"/>
+            <a:r>
+              <a:rPr lang="fr-FR" altLang="en-US" b="1"/>
+              <a:t>Concurrents directs :</a:t>
+            </a:r>
+            <a:endParaRPr lang="fr-FR" altLang="en-US" b="1"/>
+          </a:p>
+        </p:txBody>
+      </p:sp>
+      <p:sp>
+        <p:nvSpPr>
+          <p:cNvPr id="3" name="Content Placeholder 2"/>
+          <p:cNvSpPr>
+            <a:spLocks noGrp="1"/>
+          </p:cNvSpPr>
+          <p:nvPr>
+            <p:ph idx="1"/>
+          </p:nvPr>
+        </p:nvSpPr>
+        <p:spPr/>
+        <p:txBody>
+          <a:bodyPr/>
+          <a:p>
+            <a:pPr algn="ctr"/>
+            <a:r>
+              <a:rPr lang="en-US"/>
+              <a:t>Qualios.com</a:t>
+            </a:r>
+            <a:endParaRPr lang="en-US"/>
+          </a:p>
+          <a:p>
+            <a:pPr algn="ctr"/>
+            <a:r>
+              <a:rPr lang="en-US"/>
+              <a:t>Ageval.fr</a:t>
+            </a:r>
+            <a:endParaRPr lang="en-US"/>
+          </a:p>
+          <a:p>
+            <a:pPr algn="ctr"/>
+            <a:r>
+              <a:rPr lang="en-US"/>
+              <a:t>Qualilab.com</a:t>
+            </a:r>
+            <a:endParaRPr lang="en-US"/>
+          </a:p>
+        </p:txBody>
+      </p:sp>
+    </p:spTree>
+  </p:cSld>
+  <p:clrMapOvr>
+    <a:masterClrMapping/>
+  </p:clrMapOvr>
+</p:sld>
+</file>
+
+<file path=ppt/slides/slide6.xml><?xml version="1.0" encoding="utf-8"?>
+<p:sld xmlns:a="http://schemas.openxmlformats.org/drawingml/2006/main" xmlns:r="http://schemas.openxmlformats.org/officeDocument/2006/relationships" xmlns:p="http://schemas.openxmlformats.org/presentationml/2006/main">
+  <p:cSld>
+    <p:spTree>
+      <p:nvGrpSpPr>
+        <p:cNvPr id="1" name=""/>
+        <p:cNvGrpSpPr/>
+        <p:nvPr/>
+      </p:nvGrpSpPr>
+      <p:grpSpPr/>
+      <p:sp>
+        <p:nvSpPr>
+          <p:cNvPr id="2" name="Title 1"/>
+          <p:cNvSpPr>
+            <a:spLocks noGrp="1"/>
+          </p:cNvSpPr>
+          <p:nvPr>
+            <p:ph type="title"/>
+          </p:nvPr>
+        </p:nvSpPr>
+        <p:spPr/>
+        <p:txBody>
+          <a:bodyPr/>
+          <a:p>
+            <a:pPr algn="ctr"/>
+            <a:r>
+              <a:rPr lang="fr-FR" altLang="en-US" b="1"/>
+              <a:t>Charte Graphique :</a:t>
+            </a:r>
+            <a:endParaRPr lang="fr-FR" altLang="en-US" b="1"/>
+          </a:p>
+        </p:txBody>
+      </p:sp>
+      <p:sp>
+        <p:nvSpPr>
+          <p:cNvPr id="3" name="Content Placeholder 2"/>
+          <p:cNvSpPr>
+            <a:spLocks noGrp="1"/>
+          </p:cNvSpPr>
+          <p:nvPr>
+            <p:ph idx="1"/>
+          </p:nvPr>
+        </p:nvSpPr>
+        <p:spPr/>
+        <p:txBody>
+          <a:bodyPr/>
+          <a:p>
+            <a:r>
+              <a:rPr lang="fr-FR" altLang="en-US"/>
+              <a:t>Au niveau de la charte graphique, je dois simplement reprendre les mêmes éléments que sur leur application web.</a:t>
+            </a:r>
+            <a:endParaRPr lang="fr-FR" altLang="en-US"/>
+          </a:p>
+        </p:txBody>
+      </p:sp>
+    </p:spTree>
+  </p:cSld>
+  <p:clrMapOvr>
+    <a:masterClrMapping/>
+  </p:clrMapOvr>
+</p:sld>
+</file>
+
+<file path=ppt/slides/slide7.xml><?xml version="1.0" encoding="utf-8"?>
+<p:sld xmlns:a="http://schemas.openxmlformats.org/drawingml/2006/main" xmlns:r="http://schemas.openxmlformats.org/officeDocument/2006/relationships" xmlns:p="http://schemas.openxmlformats.org/presentationml/2006/main">
+  <p:cSld>
+    <p:spTree>
+      <p:nvGrpSpPr>
+        <p:cNvPr id="1" name=""/>
+        <p:cNvGrpSpPr/>
+        <p:nvPr/>
+      </p:nvGrpSpPr>
+      <p:grpSpPr/>
+      <p:sp>
+        <p:nvSpPr>
+          <p:cNvPr id="2" name="Title 1"/>
+          <p:cNvSpPr>
+            <a:spLocks noGrp="1"/>
+          </p:cNvSpPr>
+          <p:nvPr>
+            <p:ph type="title"/>
+          </p:nvPr>
+        </p:nvSpPr>
+        <p:spPr/>
+        <p:txBody>
+          <a:bodyPr/>
+          <a:p>
+            <a:pPr algn="ctr"/>
+            <a:r>
+              <a:rPr lang="fr-FR" altLang="en-US" b="1"/>
+              <a:t>Droits :</a:t>
+            </a:r>
+            <a:endParaRPr lang="fr-FR" altLang="en-US" b="1"/>
+          </a:p>
+        </p:txBody>
+      </p:sp>
+      <p:sp>
+        <p:nvSpPr>
+          <p:cNvPr id="3" name="Content Placeholder 2"/>
+          <p:cNvSpPr>
+            <a:spLocks noGrp="1"/>
+          </p:cNvSpPr>
+          <p:nvPr>
+            <p:ph idx="1"/>
+          </p:nvPr>
+        </p:nvSpPr>
+        <p:spPr/>
+        <p:txBody>
+          <a:bodyPr/>
+          <a:p>
+            <a:r>
+              <a:rPr lang="fr-FR" altLang="en-US"/>
+              <a:t>L’intégralité des droits concernant l’application reviendront à l’entreprise Winlabo.</a:t>
+            </a:r>
+            <a:endParaRPr lang="fr-FR" altLang="en-US"/>
+          </a:p>
+        </p:txBody>
+      </p:sp>
+    </p:spTree>
+  </p:cSld>
+  <p:clrMapOvr>
+    <a:masterClrMapping/>
+  </p:clrMapOvr>
+</p:sld>
+</file>
+
+<file path=ppt/slides/slide8.xml><?xml version="1.0" encoding="utf-8"?>
 <p:sld xmlns:a="http://schemas.openxmlformats.org/drawingml/2006/main" xmlns:r="http://schemas.openxmlformats.org/officeDocument/2006/relationships" xmlns:p="http://schemas.openxmlformats.org/presentationml/2006/main">
   <p:cSld>
     <p:bg>
@@ -3700,345 +5702,6 @@
 </p:sld>
 </file>
 
-<file path=ppt/slides/slide4.xml><?xml version="1.0" encoding="utf-8"?>
-<p:sld xmlns:a="http://schemas.openxmlformats.org/drawingml/2006/main" xmlns:r="http://schemas.openxmlformats.org/officeDocument/2006/relationships" xmlns:p="http://schemas.openxmlformats.org/presentationml/2006/main">
-  <p:cSld>
-    <p:spTree>
-      <p:nvGrpSpPr>
-        <p:cNvPr id="1" name=""/>
-        <p:cNvGrpSpPr/>
-        <p:nvPr/>
-      </p:nvGrpSpPr>
-      <p:grpSpPr/>
-      <p:sp>
-        <p:nvSpPr>
-          <p:cNvPr id="2" name="Title 1"/>
-          <p:cNvSpPr>
-            <a:spLocks noGrp="1"/>
-          </p:cNvSpPr>
-          <p:nvPr>
-            <p:ph type="title"/>
-          </p:nvPr>
-        </p:nvSpPr>
-        <p:spPr>
-          <a:xfrm>
-            <a:off x="1464310" y="945515"/>
-            <a:ext cx="9889490" cy="745490"/>
-          </a:xfrm>
-        </p:spPr>
-        <p:txBody>
-          <a:bodyPr>
-            <a:normAutofit fontScale="90000"/>
-          </a:bodyPr>
-          <a:p>
-            <a:endParaRPr lang="en-US"/>
-          </a:p>
-        </p:txBody>
-      </p:sp>
-      <p:pic>
-        <p:nvPicPr>
-          <p:cNvPr id="8" name="Content Placeholder 7" descr="photo_1_2023-07-01_11-39-32"/>
-          <p:cNvPicPr>
-            <a:picLocks noChangeAspect="1"/>
-          </p:cNvPicPr>
-          <p:nvPr>
-            <p:ph idx="1"/>
-          </p:nvPr>
-        </p:nvPicPr>
-        <p:blipFill>
-          <a:blip r:embed="rId1"/>
-          <a:stretch>
-            <a:fillRect/>
-          </a:stretch>
-        </p:blipFill>
-        <p:spPr>
-          <a:xfrm>
-            <a:off x="570230" y="441325"/>
-            <a:ext cx="11123930" cy="6083300"/>
-          </a:xfrm>
-          <a:prstGeom prst="rect">
-            <a:avLst/>
-          </a:prstGeom>
-        </p:spPr>
-      </p:pic>
-    </p:spTree>
-  </p:cSld>
-  <p:clrMapOvr>
-    <a:masterClrMapping/>
-  </p:clrMapOvr>
-</p:sld>
-</file>
-
-<file path=ppt/slides/slide5.xml><?xml version="1.0" encoding="utf-8"?>
-<p:sld xmlns:a="http://schemas.openxmlformats.org/drawingml/2006/main" xmlns:r="http://schemas.openxmlformats.org/officeDocument/2006/relationships" xmlns:p="http://schemas.openxmlformats.org/presentationml/2006/main">
-  <p:cSld>
-    <p:spTree>
-      <p:nvGrpSpPr>
-        <p:cNvPr id="1" name=""/>
-        <p:cNvGrpSpPr/>
-        <p:nvPr/>
-      </p:nvGrpSpPr>
-      <p:grpSpPr/>
-      <p:sp>
-        <p:nvSpPr>
-          <p:cNvPr id="2" name="Title 1"/>
-          <p:cNvSpPr>
-            <a:spLocks noGrp="1"/>
-          </p:cNvSpPr>
-          <p:nvPr>
-            <p:ph type="title"/>
-          </p:nvPr>
-        </p:nvSpPr>
-        <p:spPr/>
-        <p:txBody>
-          <a:bodyPr/>
-          <a:p>
-            <a:endParaRPr lang="en-US"/>
-          </a:p>
-        </p:txBody>
-      </p:sp>
-      <p:pic>
-        <p:nvPicPr>
-          <p:cNvPr id="4" name="Content Placeholder 3" descr="photo_2_2023-07-01_11-39-32"/>
-          <p:cNvPicPr>
-            <a:picLocks noChangeAspect="1"/>
-          </p:cNvPicPr>
-          <p:nvPr>
-            <p:ph idx="1"/>
-          </p:nvPr>
-        </p:nvPicPr>
-        <p:blipFill>
-          <a:blip r:embed="rId1"/>
-          <a:stretch>
-            <a:fillRect/>
-          </a:stretch>
-        </p:blipFill>
-        <p:spPr>
-          <a:xfrm>
-            <a:off x="455295" y="365125"/>
-            <a:ext cx="11294745" cy="6109970"/>
-          </a:xfrm>
-          <a:prstGeom prst="rect">
-            <a:avLst/>
-          </a:prstGeom>
-        </p:spPr>
-      </p:pic>
-    </p:spTree>
-  </p:cSld>
-  <p:clrMapOvr>
-    <a:masterClrMapping/>
-  </p:clrMapOvr>
-</p:sld>
-</file>
-
-<file path=ppt/slides/slide6.xml><?xml version="1.0" encoding="utf-8"?>
-<p:sld xmlns:a="http://schemas.openxmlformats.org/drawingml/2006/main" xmlns:r="http://schemas.openxmlformats.org/officeDocument/2006/relationships" xmlns:p="http://schemas.openxmlformats.org/presentationml/2006/main">
-  <p:cSld>
-    <p:spTree>
-      <p:nvGrpSpPr>
-        <p:cNvPr id="1" name=""/>
-        <p:cNvGrpSpPr/>
-        <p:nvPr/>
-      </p:nvGrpSpPr>
-      <p:grpSpPr/>
-      <p:sp>
-        <p:nvSpPr>
-          <p:cNvPr id="2" name="Title 1"/>
-          <p:cNvSpPr>
-            <a:spLocks noGrp="1"/>
-          </p:cNvSpPr>
-          <p:nvPr>
-            <p:ph type="title"/>
-          </p:nvPr>
-        </p:nvSpPr>
-        <p:spPr/>
-        <p:txBody>
-          <a:bodyPr/>
-          <a:p>
-            <a:endParaRPr lang="en-US"/>
-          </a:p>
-        </p:txBody>
-      </p:sp>
-      <p:pic>
-        <p:nvPicPr>
-          <p:cNvPr id="4" name="Content Placeholder 3" descr="photo_5_2023-07-01_11-39-32"/>
-          <p:cNvPicPr>
-            <a:picLocks noChangeAspect="1"/>
-          </p:cNvPicPr>
-          <p:nvPr>
-            <p:ph idx="1"/>
-          </p:nvPr>
-        </p:nvPicPr>
-        <p:blipFill>
-          <a:blip r:embed="rId1"/>
-          <a:stretch>
-            <a:fillRect/>
-          </a:stretch>
-        </p:blipFill>
-        <p:spPr>
-          <a:xfrm>
-            <a:off x="508000" y="365125"/>
-            <a:ext cx="11176635" cy="6111240"/>
-          </a:xfrm>
-          <a:prstGeom prst="rect">
-            <a:avLst/>
-          </a:prstGeom>
-        </p:spPr>
-      </p:pic>
-    </p:spTree>
-  </p:cSld>
-  <p:clrMapOvr>
-    <a:masterClrMapping/>
-  </p:clrMapOvr>
-</p:sld>
-</file>
-
-<file path=ppt/slides/slide7.xml><?xml version="1.0" encoding="utf-8"?>
-<p:sld xmlns:a="http://schemas.openxmlformats.org/drawingml/2006/main" xmlns:r="http://schemas.openxmlformats.org/officeDocument/2006/relationships" xmlns:p="http://schemas.openxmlformats.org/presentationml/2006/main">
-  <p:cSld>
-    <p:spTree>
-      <p:nvGrpSpPr>
-        <p:cNvPr id="1" name=""/>
-        <p:cNvGrpSpPr/>
-        <p:nvPr/>
-      </p:nvGrpSpPr>
-      <p:grpSpPr/>
-      <p:sp>
-        <p:nvSpPr>
-          <p:cNvPr id="2" name="Title 1"/>
-          <p:cNvSpPr>
-            <a:spLocks noGrp="1"/>
-          </p:cNvSpPr>
-          <p:nvPr>
-            <p:ph type="title"/>
-          </p:nvPr>
-        </p:nvSpPr>
-        <p:spPr/>
-        <p:txBody>
-          <a:bodyPr/>
-          <a:p>
-            <a:pPr algn="ctr"/>
-            <a:r>
-              <a:rPr lang="fr-FR" altLang="en-US" b="1"/>
-              <a:t>Objectifs de l’application :</a:t>
-            </a:r>
-            <a:endParaRPr lang="fr-FR" altLang="en-US" b="1"/>
-          </a:p>
-        </p:txBody>
-      </p:sp>
-      <p:sp>
-        <p:nvSpPr>
-          <p:cNvPr id="3" name="Content Placeholder 2"/>
-          <p:cNvSpPr>
-            <a:spLocks noGrp="1"/>
-          </p:cNvSpPr>
-          <p:nvPr>
-            <p:ph idx="1"/>
-          </p:nvPr>
-        </p:nvSpPr>
-        <p:spPr/>
-        <p:txBody>
-          <a:bodyPr/>
-          <a:p>
-            <a:r>
-              <a:rPr lang="fr-FR" altLang="en-US"/>
-              <a:t>Tout simplement de faciliter davantage pour les utilisateurs la déclaration d’évènement indésirables en comparaison de l’application web.</a:t>
-            </a:r>
-            <a:endParaRPr lang="fr-FR" altLang="en-US"/>
-          </a:p>
-        </p:txBody>
-      </p:sp>
-    </p:spTree>
-  </p:cSld>
-  <p:clrMapOvr>
-    <a:masterClrMapping/>
-  </p:clrMapOvr>
-</p:sld>
-</file>
-
-<file path=ppt/slides/slide8.xml><?xml version="1.0" encoding="utf-8"?>
-<p:sld xmlns:a="http://schemas.openxmlformats.org/drawingml/2006/main" xmlns:r="http://schemas.openxmlformats.org/officeDocument/2006/relationships" xmlns:p="http://schemas.openxmlformats.org/presentationml/2006/main">
-  <p:cSld>
-    <p:spTree>
-      <p:nvGrpSpPr>
-        <p:cNvPr id="1" name=""/>
-        <p:cNvGrpSpPr/>
-        <p:nvPr/>
-      </p:nvGrpSpPr>
-      <p:grpSpPr/>
-      <p:sp>
-        <p:nvSpPr>
-          <p:cNvPr id="2" name="Title 1"/>
-          <p:cNvSpPr>
-            <a:spLocks noGrp="1"/>
-          </p:cNvSpPr>
-          <p:nvPr>
-            <p:ph type="title"/>
-          </p:nvPr>
-        </p:nvSpPr>
-        <p:spPr/>
-        <p:txBody>
-          <a:bodyPr/>
-          <a:p>
-            <a:pPr algn="ctr"/>
-            <a:r>
-              <a:rPr lang="fr-FR" altLang="en-US" b="1"/>
-              <a:t>Persona:</a:t>
-            </a:r>
-            <a:endParaRPr lang="fr-FR" altLang="en-US" b="1"/>
-          </a:p>
-        </p:txBody>
-      </p:sp>
-      <p:sp>
-        <p:nvSpPr>
-          <p:cNvPr id="3" name="Content Placeholder 2"/>
-          <p:cNvSpPr>
-            <a:spLocks noGrp="1"/>
-          </p:cNvSpPr>
-          <p:nvPr>
-            <p:ph idx="1"/>
-          </p:nvPr>
-        </p:nvSpPr>
-        <p:spPr/>
-        <p:txBody>
-          <a:bodyPr/>
-          <a:p>
-            <a:r>
-              <a:rPr lang="fr-FR" altLang="en-US"/>
-              <a:t>Ce sont tous les c</a:t>
-            </a:r>
-            <a:r>
-              <a:rPr lang="en-US"/>
-              <a:t>entre</a:t>
-            </a:r>
-            <a:r>
-              <a:rPr lang="fr-FR" altLang="en-US"/>
-              <a:t>s</a:t>
-            </a:r>
-            <a:r>
-              <a:rPr lang="en-US"/>
-              <a:t> d’imagerie</a:t>
-            </a:r>
-            <a:r>
-              <a:rPr lang="fr-FR" altLang="en-US"/>
-              <a:t>s</a:t>
-            </a:r>
-            <a:r>
-              <a:rPr lang="en-US"/>
-              <a:t> parce qu’ils ont des normes à respecter et il leur faut un logiciel de management de la qualité. </a:t>
-            </a:r>
-            <a:endParaRPr lang="en-US"/>
-          </a:p>
-        </p:txBody>
-      </p:sp>
-    </p:spTree>
-  </p:cSld>
-  <p:clrMapOvr>
-    <a:masterClrMapping/>
-  </p:clrMapOvr>
-</p:sld>
-</file>
-
 <file path=ppt/slides/slide9.xml><?xml version="1.0" encoding="utf-8"?>
 <p:sld xmlns:a="http://schemas.openxmlformats.org/drawingml/2006/main" xmlns:r="http://schemas.openxmlformats.org/officeDocument/2006/relationships" xmlns:p="http://schemas.openxmlformats.org/presentationml/2006/main">
   <p:cSld>
@@ -4059,58 +5722,47 @@
             <p:ph type="title"/>
           </p:nvPr>
         </p:nvSpPr>
-        <p:spPr/>
-        <p:txBody>
-          <a:bodyPr/>
-          <a:p>
-            <a:pPr algn="ctr"/>
-            <a:r>
-              <a:rPr lang="fr-FR" altLang="en-US" b="1"/>
-              <a:t>Concurrents directs :</a:t>
-            </a:r>
-            <a:endParaRPr lang="fr-FR" altLang="en-US" b="1"/>
-          </a:p>
-        </p:txBody>
-      </p:sp>
-      <p:sp>
-        <p:nvSpPr>
-          <p:cNvPr id="3" name="Content Placeholder 2"/>
-          <p:cNvSpPr>
-            <a:spLocks noGrp="1"/>
-          </p:cNvSpPr>
+        <p:spPr>
+          <a:xfrm>
+            <a:off x="1464310" y="945515"/>
+            <a:ext cx="9889490" cy="745490"/>
+          </a:xfrm>
+        </p:spPr>
+        <p:txBody>
+          <a:bodyPr>
+            <a:normAutofit fontScale="90000"/>
+          </a:bodyPr>
+          <a:p>
+            <a:endParaRPr lang="en-US"/>
+          </a:p>
+        </p:txBody>
+      </p:sp>
+      <p:pic>
+        <p:nvPicPr>
+          <p:cNvPr id="8" name="Content Placeholder 7" descr="photo_1_2023-07-01_11-39-32"/>
+          <p:cNvPicPr>
+            <a:picLocks noChangeAspect="1"/>
+          </p:cNvPicPr>
           <p:nvPr>
             <p:ph idx="1"/>
           </p:nvPr>
-        </p:nvSpPr>
-        <p:spPr/>
-        <p:txBody>
-          <a:bodyPr/>
-          <a:p>
-            <a:pPr algn="ctr"/>
-            <a:r>
-              <a:rPr lang="en-US"/>
-              <a:t>Qualios.com</a:t>
-            </a:r>
-            <a:endParaRPr lang="en-US"/>
-          </a:p>
-          <a:p>
-            <a:pPr algn="ctr"/>
-            <a:r>
-              <a:rPr lang="en-US"/>
-              <a:t>Ageval.fr</a:t>
-            </a:r>
-            <a:endParaRPr lang="en-US"/>
-          </a:p>
-          <a:p>
-            <a:pPr algn="ctr"/>
-            <a:r>
-              <a:rPr lang="en-US"/>
-              <a:t>Qualilab.com</a:t>
-            </a:r>
-            <a:endParaRPr lang="en-US"/>
-          </a:p>
-        </p:txBody>
-      </p:sp>
+        </p:nvPicPr>
+        <p:blipFill>
+          <a:blip r:embed="rId1"/>
+          <a:stretch>
+            <a:fillRect/>
+          </a:stretch>
+        </p:blipFill>
+        <p:spPr>
+          <a:xfrm>
+            <a:off x="570230" y="441325"/>
+            <a:ext cx="11123930" cy="6083300"/>
+          </a:xfrm>
+          <a:prstGeom prst="rect">
+            <a:avLst/>
+          </a:prstGeom>
+        </p:spPr>
+      </p:pic>
     </p:spTree>
   </p:cSld>
   <p:clrMapOvr>

</xml_diff>